<commit_message>
Add     - 策略模式(The Strategy Pattern)     - 模版模式(The Template Pattern)
</commit_message>
<xml_diff>
--- a/Design pattern/4.设计模式-行为型模式.pptx
+++ b/Design pattern/4.设计模式-行为型模式.pptx
@@ -8,7 +8,7 @@
     <p:notesMasterId r:id="rId4"/>
   </p:notesMasterIdLst>
   <p:handoutMasterIdLst>
-    <p:handoutMasterId r:id="rId46"/>
+    <p:handoutMasterId r:id="rId54"/>
   </p:handoutMasterIdLst>
   <p:sldIdLst>
     <p:sldId id="453" r:id="rId3"/>
@@ -50,9 +50,17 @@
     <p:sldId id="779" r:id="rId40"/>
     <p:sldId id="780" r:id="rId41"/>
     <p:sldId id="744" r:id="rId42"/>
-    <p:sldId id="745" r:id="rId43"/>
-    <p:sldId id="746" r:id="rId44"/>
-    <p:sldId id="747" r:id="rId45"/>
+    <p:sldId id="786" r:id="rId43"/>
+    <p:sldId id="787" r:id="rId44"/>
+    <p:sldId id="788" r:id="rId45"/>
+    <p:sldId id="789" r:id="rId46"/>
+    <p:sldId id="745" r:id="rId47"/>
+    <p:sldId id="790" r:id="rId48"/>
+    <p:sldId id="791" r:id="rId49"/>
+    <p:sldId id="792" r:id="rId50"/>
+    <p:sldId id="793" r:id="rId51"/>
+    <p:sldId id="746" r:id="rId52"/>
+    <p:sldId id="747" r:id="rId53"/>
   </p:sldIdLst>
   <p:sldSz cx="9144000" cy="6858000" type="screen4x3"/>
   <p:notesSz cx="6858000" cy="9144000"/>
@@ -2855,6 +2863,678 @@
 </file>
 
 <file path=ppt/notesSlides/notesSlide30.xml><?xml version="1.0" encoding="utf-8"?>
+<p:notes xmlns:a="http://schemas.openxmlformats.org/drawingml/2006/main" xmlns:r="http://schemas.openxmlformats.org/officeDocument/2006/relationships" xmlns:p="http://schemas.openxmlformats.org/presentationml/2006/main">
+  <p:cSld>
+    <p:spTree>
+      <p:nvGrpSpPr>
+        <p:cNvPr id="1" name=""/>
+        <p:cNvGrpSpPr/>
+        <p:nvPr/>
+      </p:nvGrpSpPr>
+      <p:grpSpPr>
+        <a:xfrm>
+          <a:off x="0" y="0"/>
+          <a:ext cx="0" cy="0"/>
+          <a:chOff x="0" y="0"/>
+          <a:chExt cx="0" cy="0"/>
+        </a:xfrm>
+      </p:grpSpPr>
+      <p:sp>
+        <p:nvSpPr>
+          <p:cNvPr id="2" name="幻灯片图像占位符 1"/>
+          <p:cNvSpPr>
+            <a:spLocks noGrp="1" noRot="1" noChangeAspect="1"/>
+          </p:cNvSpPr>
+          <p:nvPr>
+            <p:ph type="sldImg"/>
+          </p:nvPr>
+        </p:nvSpPr>
+        <p:spPr>
+          <a:xfrm>
+            <a:off x="1371600" y="1143000"/>
+            <a:ext cx="4114800" cy="3086100"/>
+          </a:xfrm>
+        </p:spPr>
+      </p:sp>
+      <p:sp>
+        <p:nvSpPr>
+          <p:cNvPr id="3" name="备注占位符 2"/>
+          <p:cNvSpPr>
+            <a:spLocks noGrp="1"/>
+          </p:cNvSpPr>
+          <p:nvPr>
+            <p:ph type="body" idx="1"/>
+          </p:nvPr>
+        </p:nvSpPr>
+        <p:spPr/>
+        <p:txBody>
+          <a:bodyPr/>
+          <a:lstStyle/>
+          <a:p>
+            <a:endParaRPr lang="zh-CN" altLang="en-US" dirty="0"/>
+          </a:p>
+        </p:txBody>
+      </p:sp>
+      <p:sp>
+        <p:nvSpPr>
+          <p:cNvPr id="4" name="灯片编号占位符 3"/>
+          <p:cNvSpPr>
+            <a:spLocks noGrp="1"/>
+          </p:cNvSpPr>
+          <p:nvPr>
+            <p:ph type="sldNum" sz="quarter" idx="10"/>
+          </p:nvPr>
+        </p:nvSpPr>
+        <p:spPr/>
+        <p:txBody>
+          <a:bodyPr/>
+          <a:lstStyle/>
+          <a:p>
+            <a:fld id="{2ED26FC3-015A-4F86-ACC3-780431FB8E4D}" type="slidenum">
+              <a:rPr lang="zh-CN" altLang="en-US" smtClean="0"/>
+            </a:fld>
+            <a:endParaRPr lang="zh-CN" altLang="en-US"/>
+          </a:p>
+        </p:txBody>
+      </p:sp>
+    </p:spTree>
+  </p:cSld>
+  <p:clrMapOvr>
+    <a:masterClrMapping/>
+  </p:clrMapOvr>
+</p:notes>
+</file>
+
+<file path=ppt/notesSlides/notesSlide31.xml><?xml version="1.0" encoding="utf-8"?>
+<p:notes xmlns:a="http://schemas.openxmlformats.org/drawingml/2006/main" xmlns:r="http://schemas.openxmlformats.org/officeDocument/2006/relationships" xmlns:p="http://schemas.openxmlformats.org/presentationml/2006/main">
+  <p:cSld>
+    <p:spTree>
+      <p:nvGrpSpPr>
+        <p:cNvPr id="1" name=""/>
+        <p:cNvGrpSpPr/>
+        <p:nvPr/>
+      </p:nvGrpSpPr>
+      <p:grpSpPr>
+        <a:xfrm>
+          <a:off x="0" y="0"/>
+          <a:ext cx="0" cy="0"/>
+          <a:chOff x="0" y="0"/>
+          <a:chExt cx="0" cy="0"/>
+        </a:xfrm>
+      </p:grpSpPr>
+      <p:sp>
+        <p:nvSpPr>
+          <p:cNvPr id="2" name="幻灯片图像占位符 1"/>
+          <p:cNvSpPr>
+            <a:spLocks noGrp="1" noRot="1" noChangeAspect="1"/>
+          </p:cNvSpPr>
+          <p:nvPr>
+            <p:ph type="sldImg"/>
+          </p:nvPr>
+        </p:nvSpPr>
+        <p:spPr>
+          <a:xfrm>
+            <a:off x="1371600" y="1143000"/>
+            <a:ext cx="4114800" cy="3086100"/>
+          </a:xfrm>
+        </p:spPr>
+      </p:sp>
+      <p:sp>
+        <p:nvSpPr>
+          <p:cNvPr id="3" name="备注占位符 2"/>
+          <p:cNvSpPr>
+            <a:spLocks noGrp="1"/>
+          </p:cNvSpPr>
+          <p:nvPr>
+            <p:ph type="body" idx="1"/>
+          </p:nvPr>
+        </p:nvSpPr>
+        <p:spPr/>
+        <p:txBody>
+          <a:bodyPr/>
+          <a:lstStyle/>
+          <a:p>
+            <a:endParaRPr lang="zh-CN" altLang="en-US" dirty="0"/>
+          </a:p>
+        </p:txBody>
+      </p:sp>
+      <p:sp>
+        <p:nvSpPr>
+          <p:cNvPr id="4" name="灯片编号占位符 3"/>
+          <p:cNvSpPr>
+            <a:spLocks noGrp="1"/>
+          </p:cNvSpPr>
+          <p:nvPr>
+            <p:ph type="sldNum" sz="quarter" idx="10"/>
+          </p:nvPr>
+        </p:nvSpPr>
+        <p:spPr/>
+        <p:txBody>
+          <a:bodyPr/>
+          <a:lstStyle/>
+          <a:p>
+            <a:fld id="{2ED26FC3-015A-4F86-ACC3-780431FB8E4D}" type="slidenum">
+              <a:rPr lang="zh-CN" altLang="en-US" smtClean="0"/>
+            </a:fld>
+            <a:endParaRPr lang="zh-CN" altLang="en-US"/>
+          </a:p>
+        </p:txBody>
+      </p:sp>
+    </p:spTree>
+  </p:cSld>
+  <p:clrMapOvr>
+    <a:masterClrMapping/>
+  </p:clrMapOvr>
+</p:notes>
+</file>
+
+<file path=ppt/notesSlides/notesSlide32.xml><?xml version="1.0" encoding="utf-8"?>
+<p:notes xmlns:a="http://schemas.openxmlformats.org/drawingml/2006/main" xmlns:r="http://schemas.openxmlformats.org/officeDocument/2006/relationships" xmlns:p="http://schemas.openxmlformats.org/presentationml/2006/main">
+  <p:cSld>
+    <p:spTree>
+      <p:nvGrpSpPr>
+        <p:cNvPr id="1" name=""/>
+        <p:cNvGrpSpPr/>
+        <p:nvPr/>
+      </p:nvGrpSpPr>
+      <p:grpSpPr>
+        <a:xfrm>
+          <a:off x="0" y="0"/>
+          <a:ext cx="0" cy="0"/>
+          <a:chOff x="0" y="0"/>
+          <a:chExt cx="0" cy="0"/>
+        </a:xfrm>
+      </p:grpSpPr>
+      <p:sp>
+        <p:nvSpPr>
+          <p:cNvPr id="2" name="幻灯片图像占位符 1"/>
+          <p:cNvSpPr>
+            <a:spLocks noGrp="1" noRot="1" noChangeAspect="1"/>
+          </p:cNvSpPr>
+          <p:nvPr>
+            <p:ph type="sldImg"/>
+          </p:nvPr>
+        </p:nvSpPr>
+        <p:spPr>
+          <a:xfrm>
+            <a:off x="1371600" y="1143000"/>
+            <a:ext cx="4114800" cy="3086100"/>
+          </a:xfrm>
+        </p:spPr>
+      </p:sp>
+      <p:sp>
+        <p:nvSpPr>
+          <p:cNvPr id="3" name="备注占位符 2"/>
+          <p:cNvSpPr>
+            <a:spLocks noGrp="1"/>
+          </p:cNvSpPr>
+          <p:nvPr>
+            <p:ph type="body" idx="1"/>
+          </p:nvPr>
+        </p:nvSpPr>
+        <p:spPr/>
+        <p:txBody>
+          <a:bodyPr/>
+          <a:lstStyle/>
+          <a:p>
+            <a:r>
+              <a:rPr lang="zh-CN" altLang="en-US" dirty="0"/>
+              <a:t>最直观的场景，不想实现接口中的所有方法</a:t>
+            </a:r>
+            <a:endParaRPr lang="en-US" altLang="zh-CN" dirty="0"/>
+          </a:p>
+        </p:txBody>
+      </p:sp>
+      <p:sp>
+        <p:nvSpPr>
+          <p:cNvPr id="4" name="灯片编号占位符 3"/>
+          <p:cNvSpPr>
+            <a:spLocks noGrp="1"/>
+          </p:cNvSpPr>
+          <p:nvPr>
+            <p:ph type="sldNum" sz="quarter" idx="10"/>
+          </p:nvPr>
+        </p:nvSpPr>
+        <p:spPr/>
+        <p:txBody>
+          <a:bodyPr/>
+          <a:lstStyle/>
+          <a:p>
+            <a:fld id="{2ED26FC3-015A-4F86-ACC3-780431FB8E4D}" type="slidenum">
+              <a:rPr lang="zh-CN" altLang="en-US" smtClean="0"/>
+            </a:fld>
+            <a:endParaRPr lang="zh-CN" altLang="en-US"/>
+          </a:p>
+        </p:txBody>
+      </p:sp>
+    </p:spTree>
+  </p:cSld>
+  <p:clrMapOvr>
+    <a:masterClrMapping/>
+  </p:clrMapOvr>
+</p:notes>
+</file>
+
+<file path=ppt/notesSlides/notesSlide33.xml><?xml version="1.0" encoding="utf-8"?>
+<p:notes xmlns:a="http://schemas.openxmlformats.org/drawingml/2006/main" xmlns:r="http://schemas.openxmlformats.org/officeDocument/2006/relationships" xmlns:p="http://schemas.openxmlformats.org/presentationml/2006/main">
+  <p:cSld>
+    <p:spTree>
+      <p:nvGrpSpPr>
+        <p:cNvPr id="1" name=""/>
+        <p:cNvGrpSpPr/>
+        <p:nvPr/>
+      </p:nvGrpSpPr>
+      <p:grpSpPr>
+        <a:xfrm>
+          <a:off x="0" y="0"/>
+          <a:ext cx="0" cy="0"/>
+          <a:chOff x="0" y="0"/>
+          <a:chExt cx="0" cy="0"/>
+        </a:xfrm>
+      </p:grpSpPr>
+      <p:sp>
+        <p:nvSpPr>
+          <p:cNvPr id="2" name="幻灯片图像占位符 1"/>
+          <p:cNvSpPr>
+            <a:spLocks noGrp="1" noRot="1" noChangeAspect="1"/>
+          </p:cNvSpPr>
+          <p:nvPr>
+            <p:ph type="sldImg"/>
+          </p:nvPr>
+        </p:nvSpPr>
+        <p:spPr>
+          <a:xfrm>
+            <a:off x="1371600" y="1143000"/>
+            <a:ext cx="4114800" cy="3086100"/>
+          </a:xfrm>
+        </p:spPr>
+      </p:sp>
+      <p:sp>
+        <p:nvSpPr>
+          <p:cNvPr id="3" name="备注占位符 2"/>
+          <p:cNvSpPr>
+            <a:spLocks noGrp="1"/>
+          </p:cNvSpPr>
+          <p:nvPr>
+            <p:ph type="body" idx="1"/>
+          </p:nvPr>
+        </p:nvSpPr>
+        <p:spPr/>
+        <p:txBody>
+          <a:bodyPr/>
+          <a:lstStyle/>
+          <a:p>
+            <a:endParaRPr lang="zh-CN" altLang="en-US" dirty="0"/>
+          </a:p>
+        </p:txBody>
+      </p:sp>
+      <p:sp>
+        <p:nvSpPr>
+          <p:cNvPr id="4" name="灯片编号占位符 3"/>
+          <p:cNvSpPr>
+            <a:spLocks noGrp="1"/>
+          </p:cNvSpPr>
+          <p:nvPr>
+            <p:ph type="sldNum" sz="quarter" idx="10"/>
+          </p:nvPr>
+        </p:nvSpPr>
+        <p:spPr/>
+        <p:txBody>
+          <a:bodyPr/>
+          <a:lstStyle/>
+          <a:p>
+            <a:fld id="{2ED26FC3-015A-4F86-ACC3-780431FB8E4D}" type="slidenum">
+              <a:rPr lang="zh-CN" altLang="en-US" smtClean="0"/>
+            </a:fld>
+            <a:endParaRPr lang="zh-CN" altLang="en-US"/>
+          </a:p>
+        </p:txBody>
+      </p:sp>
+    </p:spTree>
+  </p:cSld>
+  <p:clrMapOvr>
+    <a:masterClrMapping/>
+  </p:clrMapOvr>
+</p:notes>
+</file>
+
+<file path=ppt/notesSlides/notesSlide34.xml><?xml version="1.0" encoding="utf-8"?>
+<p:notes xmlns:a="http://schemas.openxmlformats.org/drawingml/2006/main" xmlns:r="http://schemas.openxmlformats.org/officeDocument/2006/relationships" xmlns:p="http://schemas.openxmlformats.org/presentationml/2006/main">
+  <p:cSld>
+    <p:spTree>
+      <p:nvGrpSpPr>
+        <p:cNvPr id="1" name=""/>
+        <p:cNvGrpSpPr/>
+        <p:nvPr/>
+      </p:nvGrpSpPr>
+      <p:grpSpPr>
+        <a:xfrm>
+          <a:off x="0" y="0"/>
+          <a:ext cx="0" cy="0"/>
+          <a:chOff x="0" y="0"/>
+          <a:chExt cx="0" cy="0"/>
+        </a:xfrm>
+      </p:grpSpPr>
+      <p:sp>
+        <p:nvSpPr>
+          <p:cNvPr id="2" name="幻灯片图像占位符 1"/>
+          <p:cNvSpPr>
+            <a:spLocks noGrp="1" noRot="1" noChangeAspect="1"/>
+          </p:cNvSpPr>
+          <p:nvPr>
+            <p:ph type="sldImg"/>
+          </p:nvPr>
+        </p:nvSpPr>
+        <p:spPr>
+          <a:xfrm>
+            <a:off x="1371600" y="1143000"/>
+            <a:ext cx="4114800" cy="3086100"/>
+          </a:xfrm>
+        </p:spPr>
+      </p:sp>
+      <p:sp>
+        <p:nvSpPr>
+          <p:cNvPr id="3" name="备注占位符 2"/>
+          <p:cNvSpPr>
+            <a:spLocks noGrp="1"/>
+          </p:cNvSpPr>
+          <p:nvPr>
+            <p:ph type="body" idx="1"/>
+          </p:nvPr>
+        </p:nvSpPr>
+        <p:spPr/>
+        <p:txBody>
+          <a:bodyPr/>
+          <a:lstStyle/>
+          <a:p>
+            <a:endParaRPr lang="zh-CN" altLang="en-US" dirty="0"/>
+          </a:p>
+        </p:txBody>
+      </p:sp>
+      <p:sp>
+        <p:nvSpPr>
+          <p:cNvPr id="4" name="灯片编号占位符 3"/>
+          <p:cNvSpPr>
+            <a:spLocks noGrp="1"/>
+          </p:cNvSpPr>
+          <p:nvPr>
+            <p:ph type="sldNum" sz="quarter" idx="10"/>
+          </p:nvPr>
+        </p:nvSpPr>
+        <p:spPr/>
+        <p:txBody>
+          <a:bodyPr/>
+          <a:lstStyle/>
+          <a:p>
+            <a:fld id="{2ED26FC3-015A-4F86-ACC3-780431FB8E4D}" type="slidenum">
+              <a:rPr lang="zh-CN" altLang="en-US" smtClean="0"/>
+            </a:fld>
+            <a:endParaRPr lang="zh-CN" altLang="en-US"/>
+          </a:p>
+        </p:txBody>
+      </p:sp>
+    </p:spTree>
+  </p:cSld>
+  <p:clrMapOvr>
+    <a:masterClrMapping/>
+  </p:clrMapOvr>
+</p:notes>
+</file>
+
+<file path=ppt/notesSlides/notesSlide35.xml><?xml version="1.0" encoding="utf-8"?>
+<p:notes xmlns:a="http://schemas.openxmlformats.org/drawingml/2006/main" xmlns:r="http://schemas.openxmlformats.org/officeDocument/2006/relationships" xmlns:p="http://schemas.openxmlformats.org/presentationml/2006/main">
+  <p:cSld>
+    <p:spTree>
+      <p:nvGrpSpPr>
+        <p:cNvPr id="1" name=""/>
+        <p:cNvGrpSpPr/>
+        <p:nvPr/>
+      </p:nvGrpSpPr>
+      <p:grpSpPr>
+        <a:xfrm>
+          <a:off x="0" y="0"/>
+          <a:ext cx="0" cy="0"/>
+          <a:chOff x="0" y="0"/>
+          <a:chExt cx="0" cy="0"/>
+        </a:xfrm>
+      </p:grpSpPr>
+      <p:sp>
+        <p:nvSpPr>
+          <p:cNvPr id="2" name="幻灯片图像占位符 1"/>
+          <p:cNvSpPr>
+            <a:spLocks noGrp="1" noRot="1" noChangeAspect="1"/>
+          </p:cNvSpPr>
+          <p:nvPr>
+            <p:ph type="sldImg"/>
+          </p:nvPr>
+        </p:nvSpPr>
+        <p:spPr>
+          <a:xfrm>
+            <a:off x="1371600" y="1143000"/>
+            <a:ext cx="4114800" cy="3086100"/>
+          </a:xfrm>
+        </p:spPr>
+      </p:sp>
+      <p:sp>
+        <p:nvSpPr>
+          <p:cNvPr id="3" name="备注占位符 2"/>
+          <p:cNvSpPr>
+            <a:spLocks noGrp="1"/>
+          </p:cNvSpPr>
+          <p:nvPr>
+            <p:ph type="body" idx="1"/>
+          </p:nvPr>
+        </p:nvSpPr>
+        <p:spPr/>
+        <p:txBody>
+          <a:bodyPr/>
+          <a:lstStyle/>
+          <a:p>
+            <a:endParaRPr lang="zh-CN" altLang="en-US" dirty="0"/>
+          </a:p>
+        </p:txBody>
+      </p:sp>
+      <p:sp>
+        <p:nvSpPr>
+          <p:cNvPr id="4" name="灯片编号占位符 3"/>
+          <p:cNvSpPr>
+            <a:spLocks noGrp="1"/>
+          </p:cNvSpPr>
+          <p:nvPr>
+            <p:ph type="sldNum" sz="quarter" idx="10"/>
+          </p:nvPr>
+        </p:nvSpPr>
+        <p:spPr/>
+        <p:txBody>
+          <a:bodyPr/>
+          <a:lstStyle/>
+          <a:p>
+            <a:fld id="{2ED26FC3-015A-4F86-ACC3-780431FB8E4D}" type="slidenum">
+              <a:rPr lang="zh-CN" altLang="en-US" smtClean="0"/>
+            </a:fld>
+            <a:endParaRPr lang="zh-CN" altLang="en-US"/>
+          </a:p>
+        </p:txBody>
+      </p:sp>
+    </p:spTree>
+  </p:cSld>
+  <p:clrMapOvr>
+    <a:masterClrMapping/>
+  </p:clrMapOvr>
+</p:notes>
+</file>
+
+<file path=ppt/notesSlides/notesSlide36.xml><?xml version="1.0" encoding="utf-8"?>
+<p:notes xmlns:a="http://schemas.openxmlformats.org/drawingml/2006/main" xmlns:r="http://schemas.openxmlformats.org/officeDocument/2006/relationships" xmlns:p="http://schemas.openxmlformats.org/presentationml/2006/main">
+  <p:cSld>
+    <p:spTree>
+      <p:nvGrpSpPr>
+        <p:cNvPr id="1" name=""/>
+        <p:cNvGrpSpPr/>
+        <p:nvPr/>
+      </p:nvGrpSpPr>
+      <p:grpSpPr>
+        <a:xfrm>
+          <a:off x="0" y="0"/>
+          <a:ext cx="0" cy="0"/>
+          <a:chOff x="0" y="0"/>
+          <a:chExt cx="0" cy="0"/>
+        </a:xfrm>
+      </p:grpSpPr>
+      <p:sp>
+        <p:nvSpPr>
+          <p:cNvPr id="2" name="幻灯片图像占位符 1"/>
+          <p:cNvSpPr>
+            <a:spLocks noGrp="1" noRot="1" noChangeAspect="1"/>
+          </p:cNvSpPr>
+          <p:nvPr>
+            <p:ph type="sldImg"/>
+          </p:nvPr>
+        </p:nvSpPr>
+        <p:spPr>
+          <a:xfrm>
+            <a:off x="1371600" y="1143000"/>
+            <a:ext cx="4114800" cy="3086100"/>
+          </a:xfrm>
+        </p:spPr>
+      </p:sp>
+      <p:sp>
+        <p:nvSpPr>
+          <p:cNvPr id="3" name="备注占位符 2"/>
+          <p:cNvSpPr>
+            <a:spLocks noGrp="1"/>
+          </p:cNvSpPr>
+          <p:nvPr>
+            <p:ph type="body" idx="1"/>
+          </p:nvPr>
+        </p:nvSpPr>
+        <p:spPr/>
+        <p:txBody>
+          <a:bodyPr/>
+          <a:lstStyle/>
+          <a:p>
+            <a:r>
+              <a:rPr lang="zh-CN" altLang="en-US" dirty="0"/>
+              <a:t>最直观的场景，不想实现接口中的所有方法</a:t>
+            </a:r>
+            <a:endParaRPr lang="en-US" altLang="zh-CN" dirty="0"/>
+          </a:p>
+        </p:txBody>
+      </p:sp>
+      <p:sp>
+        <p:nvSpPr>
+          <p:cNvPr id="4" name="灯片编号占位符 3"/>
+          <p:cNvSpPr>
+            <a:spLocks noGrp="1"/>
+          </p:cNvSpPr>
+          <p:nvPr>
+            <p:ph type="sldNum" sz="quarter" idx="10"/>
+          </p:nvPr>
+        </p:nvSpPr>
+        <p:spPr/>
+        <p:txBody>
+          <a:bodyPr/>
+          <a:lstStyle/>
+          <a:p>
+            <a:fld id="{2ED26FC3-015A-4F86-ACC3-780431FB8E4D}" type="slidenum">
+              <a:rPr lang="zh-CN" altLang="en-US" smtClean="0"/>
+            </a:fld>
+            <a:endParaRPr lang="zh-CN" altLang="en-US"/>
+          </a:p>
+        </p:txBody>
+      </p:sp>
+    </p:spTree>
+  </p:cSld>
+  <p:clrMapOvr>
+    <a:masterClrMapping/>
+  </p:clrMapOvr>
+</p:notes>
+</file>
+
+<file path=ppt/notesSlides/notesSlide37.xml><?xml version="1.0" encoding="utf-8"?>
+<p:notes xmlns:a="http://schemas.openxmlformats.org/drawingml/2006/main" xmlns:r="http://schemas.openxmlformats.org/officeDocument/2006/relationships" xmlns:p="http://schemas.openxmlformats.org/presentationml/2006/main">
+  <p:cSld>
+    <p:spTree>
+      <p:nvGrpSpPr>
+        <p:cNvPr id="1" name=""/>
+        <p:cNvGrpSpPr/>
+        <p:nvPr/>
+      </p:nvGrpSpPr>
+      <p:grpSpPr>
+        <a:xfrm>
+          <a:off x="0" y="0"/>
+          <a:ext cx="0" cy="0"/>
+          <a:chOff x="0" y="0"/>
+          <a:chExt cx="0" cy="0"/>
+        </a:xfrm>
+      </p:grpSpPr>
+      <p:sp>
+        <p:nvSpPr>
+          <p:cNvPr id="2" name="幻灯片图像占位符 1"/>
+          <p:cNvSpPr>
+            <a:spLocks noGrp="1" noRot="1" noChangeAspect="1"/>
+          </p:cNvSpPr>
+          <p:nvPr>
+            <p:ph type="sldImg"/>
+          </p:nvPr>
+        </p:nvSpPr>
+        <p:spPr>
+          <a:xfrm>
+            <a:off x="1371600" y="1143000"/>
+            <a:ext cx="4114800" cy="3086100"/>
+          </a:xfrm>
+        </p:spPr>
+      </p:sp>
+      <p:sp>
+        <p:nvSpPr>
+          <p:cNvPr id="3" name="备注占位符 2"/>
+          <p:cNvSpPr>
+            <a:spLocks noGrp="1"/>
+          </p:cNvSpPr>
+          <p:nvPr>
+            <p:ph type="body" idx="1"/>
+          </p:nvPr>
+        </p:nvSpPr>
+        <p:spPr/>
+        <p:txBody>
+          <a:bodyPr/>
+          <a:lstStyle/>
+          <a:p>
+            <a:endParaRPr lang="zh-CN" altLang="en-US" dirty="0"/>
+          </a:p>
+        </p:txBody>
+      </p:sp>
+      <p:sp>
+        <p:nvSpPr>
+          <p:cNvPr id="4" name="灯片编号占位符 3"/>
+          <p:cNvSpPr>
+            <a:spLocks noGrp="1"/>
+          </p:cNvSpPr>
+          <p:nvPr>
+            <p:ph type="sldNum" sz="quarter" idx="10"/>
+          </p:nvPr>
+        </p:nvSpPr>
+        <p:spPr/>
+        <p:txBody>
+          <a:bodyPr/>
+          <a:lstStyle/>
+          <a:p>
+            <a:fld id="{2ED26FC3-015A-4F86-ACC3-780431FB8E4D}" type="slidenum">
+              <a:rPr lang="zh-CN" altLang="en-US" smtClean="0"/>
+            </a:fld>
+            <a:endParaRPr lang="zh-CN" altLang="en-US"/>
+          </a:p>
+        </p:txBody>
+      </p:sp>
+    </p:spTree>
+  </p:cSld>
+  <p:clrMapOvr>
+    <a:masterClrMapping/>
+  </p:clrMapOvr>
+</p:notes>
+</file>
+
+<file path=ppt/notesSlides/notesSlide38.xml><?xml version="1.0" encoding="utf-8"?>
 <p:notes xmlns:a="http://schemas.openxmlformats.org/drawingml/2006/main" xmlns:r="http://schemas.openxmlformats.org/officeDocument/2006/relationships" xmlns:p="http://schemas.openxmlformats.org/presentationml/2006/main">
   <p:cSld>
     <p:spTree>
@@ -13153,60 +13833,128 @@
       </p:grpSpPr>
       <p:sp>
         <p:nvSpPr>
-          <p:cNvPr id="2" name="标题 1"/>
-          <p:cNvSpPr>
-            <a:spLocks noGrp="1"/>
-          </p:cNvSpPr>
-          <p:nvPr>
-            <p:ph type="title"/>
+          <p:cNvPr id="8" name="标题 1"/>
+          <p:cNvSpPr txBox="1"/>
+          <p:nvPr>
+            <p:custDataLst>
+              <p:tags r:id="rId1"/>
+            </p:custDataLst>
           </p:nvPr>
         </p:nvSpPr>
         <p:spPr>
           <a:xfrm>
-            <a:off x="1138792" y="3078833"/>
-            <a:ext cx="6856892" cy="830998"/>
+            <a:off x="571608" y="661194"/>
+            <a:ext cx="7886700" cy="994172"/>
           </a:xfrm>
+          <a:prstGeom prst="rect">
+            <a:avLst/>
+          </a:prstGeom>
         </p:spPr>
         <p:txBody>
-          <a:bodyPr>
-            <a:noAutofit/>
+          <a:bodyPr vert="horz" wrap="square" lIns="68580" tIns="34290" rIns="68580" bIns="34290" rtlCol="0" anchor="ctr">
+            <a:normAutofit/>
+          </a:bodyPr>
+          <a:lstStyle>
+            <a:lvl1pPr defTabSz="914400">
+              <a:lnSpc>
+                <a:spcPct val="120000"/>
+              </a:lnSpc>
+              <a:spcBef>
+                <a:spcPct val="0"/>
+              </a:spcBef>
+              <a:buNone/>
+              <a:defRPr sz="3600">
+                <a:solidFill>
+                  <a:schemeClr val="tx1">
+                    <a:lumMod val="75000"/>
+                    <a:lumOff val="25000"/>
+                  </a:schemeClr>
+                </a:solidFill>
+                <a:latin typeface="+mj-lt"/>
+                <a:ea typeface="+mj-ea"/>
+                <a:cs typeface="+mj-cs"/>
+              </a:defRPr>
+            </a:lvl1pPr>
+          </a:lstStyle>
+          <a:p>
+            <a:r>
+              <a:rPr dirty="0">
+                <a:sym typeface="+mn-ea"/>
+              </a:rPr>
+              <a:t>策略模式(The Strategy Pattern)</a:t>
+            </a:r>
+            <a:endParaRPr dirty="0">
+              <a:sym typeface="+mn-ea"/>
+            </a:endParaRPr>
+          </a:p>
+        </p:txBody>
+      </p:sp>
+      <p:sp>
+        <p:nvSpPr>
+          <p:cNvPr id="3" name="文本框 2"/>
+          <p:cNvSpPr txBox="1"/>
+          <p:nvPr/>
+        </p:nvSpPr>
+        <p:spPr>
+          <a:xfrm>
+            <a:off x="566431" y="2057436"/>
+            <a:ext cx="8334776" cy="1198880"/>
+          </a:xfrm>
+          <a:prstGeom prst="rect">
+            <a:avLst/>
+          </a:prstGeom>
+          <a:noFill/>
+        </p:spPr>
+        <p:txBody>
+          <a:bodyPr wrap="square" rtlCol="0">
+            <a:spAutoFit/>
           </a:bodyPr>
           <a:lstStyle/>
           <a:p>
-            <a:r>
-              <a:rPr lang="en-US" altLang="zh-CN" sz="3600" dirty="0"/>
-              <a:t>The Template Pattern</a:t>
-            </a:r>
-            <a:endParaRPr lang="en-US" altLang="zh-CN" sz="3600" dirty="0"/>
-          </a:p>
-        </p:txBody>
-      </p:sp>
-      <p:sp>
-        <p:nvSpPr>
-          <p:cNvPr id="3" name="内容占位符 2"/>
-          <p:cNvSpPr>
-            <a:spLocks noGrp="1"/>
-          </p:cNvSpPr>
-          <p:nvPr>
-            <p:ph sz="quarter" idx="13"/>
-          </p:nvPr>
-        </p:nvSpPr>
-        <p:spPr/>
-        <p:txBody>
-          <a:bodyPr>
-            <a:normAutofit/>
-          </a:bodyPr>
-          <a:lstStyle/>
-          <a:p>
-            <a:r>
-              <a:rPr lang="zh-CN" altLang="en-US" dirty="0"/>
-              <a:t>模版模式</a:t>
+            <a:pPr indent="0" eaLnBrk="1" hangingPunct="1">
+              <a:lnSpc>
+                <a:spcPct val="150000"/>
+              </a:lnSpc>
+              <a:buFont typeface="Wingdings" panose="05000000000000000000" pitchFamily="2" charset="2"/>
+              <a:buNone/>
+            </a:pPr>
+            <a:r>
+              <a:rPr lang="zh-CN" altLang="en-US" b="1" dirty="0">
+                <a:solidFill>
+                  <a:srgbClr val="0070C0"/>
+                </a:solidFill>
+              </a:rPr>
+              <a:t>定义</a:t>
             </a:r>
             <a:endParaRPr lang="zh-CN" altLang="en-US" dirty="0"/>
           </a:p>
+          <a:p>
+            <a:pPr marL="0" indent="461010" eaLnBrk="1" latinLnBrk="0" hangingPunct="1">
+              <a:lnSpc>
+                <a:spcPct val="200000"/>
+              </a:lnSpc>
+              <a:buClr>
+                <a:srgbClr val="0070C0"/>
+              </a:buClr>
+              <a:buFont typeface="+mj-lt"/>
+              <a:buNone/>
+            </a:pPr>
+            <a:r>
+              <a:rPr sz="1800" dirty="0"/>
+              <a:t>一个类的行为或其算法可以在运行时更改</a:t>
+            </a:r>
+            <a:r>
+              <a:rPr lang="zh-CN" sz="1800" dirty="0"/>
+              <a:t>。</a:t>
+            </a:r>
+            <a:endParaRPr lang="zh-CN" sz="1800" dirty="0"/>
+          </a:p>
         </p:txBody>
       </p:sp>
     </p:spTree>
+    <p:custDataLst>
+      <p:tags r:id="rId2"/>
+    </p:custDataLst>
   </p:cSld>
   <p:clrMapOvr>
     <a:masterClrMapping/>
@@ -13233,60 +13981,187 @@
       </p:grpSpPr>
       <p:sp>
         <p:nvSpPr>
-          <p:cNvPr id="2" name="标题 1"/>
-          <p:cNvSpPr>
-            <a:spLocks noGrp="1"/>
-          </p:cNvSpPr>
-          <p:nvPr>
-            <p:ph type="title"/>
+          <p:cNvPr id="8" name="标题 1"/>
+          <p:cNvSpPr txBox="1"/>
+          <p:nvPr>
+            <p:custDataLst>
+              <p:tags r:id="rId1"/>
+            </p:custDataLst>
           </p:nvPr>
         </p:nvSpPr>
         <p:spPr>
           <a:xfrm>
-            <a:off x="1138792" y="3078833"/>
-            <a:ext cx="6856892" cy="830998"/>
+            <a:off x="571608" y="661194"/>
+            <a:ext cx="7886700" cy="994172"/>
           </a:xfrm>
+          <a:prstGeom prst="rect">
+            <a:avLst/>
+          </a:prstGeom>
         </p:spPr>
         <p:txBody>
-          <a:bodyPr>
-            <a:noAutofit/>
+          <a:bodyPr vert="horz" wrap="square" lIns="68580" tIns="34290" rIns="68580" bIns="34290" rtlCol="0" anchor="ctr">
+            <a:normAutofit/>
+          </a:bodyPr>
+          <a:lstStyle>
+            <a:lvl1pPr defTabSz="914400">
+              <a:lnSpc>
+                <a:spcPct val="120000"/>
+              </a:lnSpc>
+              <a:spcBef>
+                <a:spcPct val="0"/>
+              </a:spcBef>
+              <a:buNone/>
+              <a:defRPr sz="3600">
+                <a:solidFill>
+                  <a:schemeClr val="tx1">
+                    <a:lumMod val="75000"/>
+                    <a:lumOff val="25000"/>
+                  </a:schemeClr>
+                </a:solidFill>
+                <a:latin typeface="+mj-lt"/>
+                <a:ea typeface="+mj-ea"/>
+                <a:cs typeface="+mj-cs"/>
+              </a:defRPr>
+            </a:lvl1pPr>
+          </a:lstStyle>
+          <a:p>
+            <a:r>
+              <a:rPr dirty="0">
+                <a:sym typeface="+mn-ea"/>
+              </a:rPr>
+              <a:t>策略模式(The Strategy Pattern)</a:t>
+            </a:r>
+            <a:endParaRPr dirty="0">
+              <a:sym typeface="+mn-ea"/>
+            </a:endParaRPr>
+          </a:p>
+        </p:txBody>
+      </p:sp>
+      <p:sp>
+        <p:nvSpPr>
+          <p:cNvPr id="3" name="文本框 2"/>
+          <p:cNvSpPr txBox="1"/>
+          <p:nvPr/>
+        </p:nvSpPr>
+        <p:spPr>
+          <a:xfrm>
+            <a:off x="566431" y="2057436"/>
+            <a:ext cx="8334776" cy="3599815"/>
+          </a:xfrm>
+          <a:prstGeom prst="rect">
+            <a:avLst/>
+          </a:prstGeom>
+          <a:noFill/>
+        </p:spPr>
+        <p:txBody>
+          <a:bodyPr wrap="square" rtlCol="0">
+            <a:spAutoFit/>
           </a:bodyPr>
           <a:lstStyle/>
           <a:p>
-            <a:r>
-              <a:rPr lang="en-US" altLang="zh-CN" sz="3600" dirty="0"/>
-              <a:t>The Visitor Pattern</a:t>
-            </a:r>
-            <a:endParaRPr lang="en-US" altLang="zh-CN" sz="3600" dirty="0"/>
-          </a:p>
-        </p:txBody>
-      </p:sp>
-      <p:sp>
-        <p:nvSpPr>
-          <p:cNvPr id="3" name="内容占位符 2"/>
-          <p:cNvSpPr>
-            <a:spLocks noGrp="1"/>
-          </p:cNvSpPr>
-          <p:nvPr>
-            <p:ph sz="quarter" idx="13"/>
-          </p:nvPr>
-        </p:nvSpPr>
-        <p:spPr/>
-        <p:txBody>
-          <a:bodyPr>
-            <a:normAutofit/>
-          </a:bodyPr>
-          <a:lstStyle/>
-          <a:p>
-            <a:r>
-              <a:rPr lang="zh-CN" altLang="en-US" dirty="0"/>
-              <a:t>访问者模式</a:t>
-            </a:r>
-            <a:endParaRPr lang="zh-CN" altLang="en-US" dirty="0"/>
+            <a:pPr indent="0" eaLnBrk="1" hangingPunct="1">
+              <a:lnSpc>
+                <a:spcPct val="150000"/>
+              </a:lnSpc>
+              <a:buFont typeface="Wingdings" panose="05000000000000000000" pitchFamily="2" charset="2"/>
+              <a:buNone/>
+            </a:pPr>
+            <a:r>
+              <a:rPr lang="zh-CN" altLang="en-US" b="1" dirty="0">
+                <a:solidFill>
+                  <a:srgbClr val="0070C0"/>
+                </a:solidFill>
+              </a:rPr>
+              <a:t>适用场景</a:t>
+            </a:r>
+            <a:endParaRPr lang="en-US" altLang="zh-CN" b="1" dirty="0">
+              <a:solidFill>
+                <a:srgbClr val="0070C0"/>
+              </a:solidFill>
+            </a:endParaRPr>
+          </a:p>
+          <a:p>
+            <a:pPr marL="342900" indent="-342900" eaLnBrk="1" latinLnBrk="0" hangingPunct="1">
+              <a:lnSpc>
+                <a:spcPct val="200000"/>
+              </a:lnSpc>
+              <a:buClr>
+                <a:srgbClr val="0070C0"/>
+              </a:buClr>
+              <a:buFont typeface="+mj-lt"/>
+              <a:buAutoNum type="arabicPeriod"/>
+            </a:pPr>
+            <a:endParaRPr sz="1600" dirty="0"/>
+          </a:p>
+          <a:p>
+            <a:pPr marL="342900" indent="-342900" eaLnBrk="1" latinLnBrk="0" hangingPunct="1">
+              <a:lnSpc>
+                <a:spcPct val="200000"/>
+              </a:lnSpc>
+              <a:buClr>
+                <a:srgbClr val="0070C0"/>
+              </a:buClr>
+              <a:buFont typeface="+mj-lt"/>
+              <a:buAutoNum type="arabicPeriod"/>
+            </a:pPr>
+            <a:r>
+              <a:rPr sz="1600" dirty="0"/>
+              <a:t>如果在一个系统里面有许多类，它们之间的区别仅在于它们的行为，那么使用策略模式可以动态地让一个对象在许多行为中选择一种行为</a:t>
+            </a:r>
+            <a:r>
+              <a:rPr lang="zh-CN" sz="1600" dirty="0"/>
+              <a:t>；</a:t>
+            </a:r>
+            <a:endParaRPr lang="zh-CN" sz="1600" dirty="0"/>
+          </a:p>
+          <a:p>
+            <a:pPr marL="342900" indent="-342900" eaLnBrk="1" latinLnBrk="0" hangingPunct="1">
+              <a:lnSpc>
+                <a:spcPct val="200000"/>
+              </a:lnSpc>
+              <a:buClr>
+                <a:srgbClr val="0070C0"/>
+              </a:buClr>
+              <a:buFont typeface="+mj-lt"/>
+              <a:buAutoNum type="arabicPeriod"/>
+            </a:pPr>
+            <a:r>
+              <a:rPr sz="1600" dirty="0"/>
+              <a:t>一个系统需要动态地在几种算法中选择一种</a:t>
+            </a:r>
+            <a:r>
+              <a:rPr lang="zh-CN" sz="1600" dirty="0"/>
+              <a:t>；</a:t>
+            </a:r>
+            <a:endParaRPr lang="zh-CN" sz="1600" dirty="0"/>
+          </a:p>
+          <a:p>
+            <a:pPr marL="342900" indent="-342900" eaLnBrk="1" latinLnBrk="0" hangingPunct="1">
+              <a:lnSpc>
+                <a:spcPct val="200000"/>
+              </a:lnSpc>
+              <a:buClr>
+                <a:srgbClr val="0070C0"/>
+              </a:buClr>
+              <a:buFont typeface="+mj-lt"/>
+              <a:buAutoNum type="arabicPeriod"/>
+            </a:pPr>
+            <a:r>
+              <a:rPr sz="1600" dirty="0"/>
+              <a:t>如果一个对象有很多的行为，如果不用恰当的模式，这些行为就只好使用多重的条件选择语句来实现</a:t>
+            </a:r>
+            <a:r>
+              <a:rPr lang="zh-CN" sz="1600" dirty="0"/>
+              <a:t>；</a:t>
+            </a:r>
+            <a:endParaRPr lang="zh-CN" sz="1600" dirty="0"/>
           </a:p>
         </p:txBody>
       </p:sp>
     </p:spTree>
+    <p:custDataLst>
+      <p:tags r:id="rId2"/>
+    </p:custDataLst>
   </p:cSld>
   <p:clrMapOvr>
     <a:masterClrMapping/>
@@ -13313,6 +14188,359 @@
       </p:grpSpPr>
       <p:sp>
         <p:nvSpPr>
+          <p:cNvPr id="8" name="标题 1"/>
+          <p:cNvSpPr txBox="1"/>
+          <p:nvPr>
+            <p:custDataLst>
+              <p:tags r:id="rId1"/>
+            </p:custDataLst>
+          </p:nvPr>
+        </p:nvSpPr>
+        <p:spPr>
+          <a:xfrm>
+            <a:off x="571608" y="661194"/>
+            <a:ext cx="7886700" cy="994172"/>
+          </a:xfrm>
+          <a:prstGeom prst="rect">
+            <a:avLst/>
+          </a:prstGeom>
+        </p:spPr>
+        <p:txBody>
+          <a:bodyPr vert="horz" wrap="square" lIns="68580" tIns="34290" rIns="68580" bIns="34290" rtlCol="0" anchor="ctr">
+            <a:normAutofit/>
+          </a:bodyPr>
+          <a:lstStyle>
+            <a:lvl1pPr defTabSz="914400">
+              <a:lnSpc>
+                <a:spcPct val="120000"/>
+              </a:lnSpc>
+              <a:spcBef>
+                <a:spcPct val="0"/>
+              </a:spcBef>
+              <a:buNone/>
+              <a:defRPr sz="3600">
+                <a:solidFill>
+                  <a:schemeClr val="tx1">
+                    <a:lumMod val="75000"/>
+                    <a:lumOff val="25000"/>
+                  </a:schemeClr>
+                </a:solidFill>
+                <a:latin typeface="+mj-lt"/>
+                <a:ea typeface="+mj-ea"/>
+                <a:cs typeface="+mj-cs"/>
+              </a:defRPr>
+            </a:lvl1pPr>
+          </a:lstStyle>
+          <a:p>
+            <a:r>
+              <a:rPr dirty="0">
+                <a:sym typeface="+mn-ea"/>
+              </a:rPr>
+              <a:t>策略模式(The Strategy Pattern)</a:t>
+            </a:r>
+            <a:endParaRPr dirty="0">
+              <a:sym typeface="+mn-ea"/>
+            </a:endParaRPr>
+          </a:p>
+        </p:txBody>
+      </p:sp>
+      <p:sp>
+        <p:nvSpPr>
+          <p:cNvPr id="3" name="文本框 2"/>
+          <p:cNvSpPr txBox="1"/>
+          <p:nvPr/>
+        </p:nvSpPr>
+        <p:spPr>
+          <a:xfrm>
+            <a:off x="566431" y="2057436"/>
+            <a:ext cx="8334776" cy="2861310"/>
+          </a:xfrm>
+          <a:prstGeom prst="rect">
+            <a:avLst/>
+          </a:prstGeom>
+          <a:noFill/>
+        </p:spPr>
+        <p:txBody>
+          <a:bodyPr wrap="square" rtlCol="0">
+            <a:spAutoFit/>
+          </a:bodyPr>
+          <a:lstStyle/>
+          <a:p>
+            <a:pPr indent="0" eaLnBrk="1" hangingPunct="1">
+              <a:lnSpc>
+                <a:spcPct val="150000"/>
+              </a:lnSpc>
+              <a:buFont typeface="Wingdings" panose="05000000000000000000" pitchFamily="2" charset="2"/>
+              <a:buNone/>
+            </a:pPr>
+            <a:r>
+              <a:rPr lang="zh-CN" altLang="en-US" b="1" dirty="0">
+                <a:solidFill>
+                  <a:srgbClr val="0070C0"/>
+                </a:solidFill>
+              </a:rPr>
+              <a:t>优点</a:t>
+            </a:r>
+            <a:endParaRPr lang="zh-CN" altLang="en-US" b="1" dirty="0">
+              <a:solidFill>
+                <a:srgbClr val="0070C0"/>
+              </a:solidFill>
+            </a:endParaRPr>
+          </a:p>
+          <a:p>
+            <a:pPr indent="0" eaLnBrk="1" hangingPunct="1">
+              <a:lnSpc>
+                <a:spcPct val="150000"/>
+              </a:lnSpc>
+              <a:buFont typeface="Wingdings" panose="05000000000000000000" pitchFamily="2" charset="2"/>
+              <a:buNone/>
+            </a:pPr>
+            <a:endParaRPr lang="zh-CN" altLang="en-US" dirty="0"/>
+          </a:p>
+          <a:p>
+            <a:pPr marL="457200" indent="-457200" eaLnBrk="1" latinLnBrk="0" hangingPunct="1">
+              <a:lnSpc>
+                <a:spcPct val="200000"/>
+              </a:lnSpc>
+              <a:buClr>
+                <a:srgbClr val="0070C0"/>
+              </a:buClr>
+              <a:buFont typeface="+mj-lt"/>
+              <a:buAutoNum type="arabicPeriod"/>
+            </a:pPr>
+            <a:r>
+              <a:rPr lang="zh-CN" altLang="en-US" sz="1800" dirty="0"/>
+              <a:t>算法可以自由切换；</a:t>
+            </a:r>
+            <a:endParaRPr lang="zh-CN" altLang="en-US" sz="1800" dirty="0"/>
+          </a:p>
+          <a:p>
+            <a:pPr marL="457200" indent="-457200" eaLnBrk="1" latinLnBrk="0" hangingPunct="1">
+              <a:lnSpc>
+                <a:spcPct val="200000"/>
+              </a:lnSpc>
+              <a:buClr>
+                <a:srgbClr val="0070C0"/>
+              </a:buClr>
+              <a:buFont typeface="+mj-lt"/>
+              <a:buAutoNum type="arabicPeriod"/>
+            </a:pPr>
+            <a:r>
+              <a:rPr lang="zh-CN" altLang="en-US" sz="1800" dirty="0"/>
+              <a:t>避免使用多重条件判断；</a:t>
+            </a:r>
+            <a:endParaRPr lang="zh-CN" altLang="en-US" sz="1800" dirty="0"/>
+          </a:p>
+          <a:p>
+            <a:pPr marL="457200" indent="-457200" eaLnBrk="1" latinLnBrk="0" hangingPunct="1">
+              <a:lnSpc>
+                <a:spcPct val="200000"/>
+              </a:lnSpc>
+              <a:buClr>
+                <a:srgbClr val="0070C0"/>
+              </a:buClr>
+              <a:buFont typeface="+mj-lt"/>
+              <a:buAutoNum type="arabicPeriod"/>
+            </a:pPr>
+            <a:r>
+              <a:rPr lang="zh-CN" altLang="en-US" sz="1800" dirty="0"/>
+              <a:t>扩展性良好。</a:t>
+            </a:r>
+            <a:endParaRPr lang="zh-CN" altLang="en-US" sz="1800" dirty="0"/>
+          </a:p>
+        </p:txBody>
+      </p:sp>
+    </p:spTree>
+    <p:custDataLst>
+      <p:tags r:id="rId2"/>
+    </p:custDataLst>
+  </p:cSld>
+  <p:clrMapOvr>
+    <a:masterClrMapping/>
+  </p:clrMapOvr>
+</p:sld>
+</file>
+
+<file path=ppt/slides/slide43.xml><?xml version="1.0" encoding="utf-8"?>
+<p:sld xmlns:a="http://schemas.openxmlformats.org/drawingml/2006/main" xmlns:r="http://schemas.openxmlformats.org/officeDocument/2006/relationships" xmlns:p="http://schemas.openxmlformats.org/presentationml/2006/main">
+  <p:cSld>
+    <p:spTree>
+      <p:nvGrpSpPr>
+        <p:cNvPr id="1" name=""/>
+        <p:cNvGrpSpPr/>
+        <p:nvPr/>
+      </p:nvGrpSpPr>
+      <p:grpSpPr>
+        <a:xfrm>
+          <a:off x="0" y="0"/>
+          <a:ext cx="0" cy="0"/>
+          <a:chOff x="0" y="0"/>
+          <a:chExt cx="0" cy="0"/>
+        </a:xfrm>
+      </p:grpSpPr>
+      <p:sp>
+        <p:nvSpPr>
+          <p:cNvPr id="8" name="标题 1"/>
+          <p:cNvSpPr txBox="1"/>
+          <p:nvPr>
+            <p:custDataLst>
+              <p:tags r:id="rId1"/>
+            </p:custDataLst>
+          </p:nvPr>
+        </p:nvSpPr>
+        <p:spPr>
+          <a:xfrm>
+            <a:off x="571608" y="661194"/>
+            <a:ext cx="7886700" cy="994172"/>
+          </a:xfrm>
+          <a:prstGeom prst="rect">
+            <a:avLst/>
+          </a:prstGeom>
+        </p:spPr>
+        <p:txBody>
+          <a:bodyPr vert="horz" wrap="square" lIns="68580" tIns="34290" rIns="68580" bIns="34290" rtlCol="0" anchor="ctr">
+            <a:normAutofit/>
+          </a:bodyPr>
+          <a:lstStyle>
+            <a:lvl1pPr defTabSz="914400">
+              <a:lnSpc>
+                <a:spcPct val="120000"/>
+              </a:lnSpc>
+              <a:spcBef>
+                <a:spcPct val="0"/>
+              </a:spcBef>
+              <a:buNone/>
+              <a:defRPr sz="3600">
+                <a:solidFill>
+                  <a:schemeClr val="tx1">
+                    <a:lumMod val="75000"/>
+                    <a:lumOff val="25000"/>
+                  </a:schemeClr>
+                </a:solidFill>
+                <a:latin typeface="+mj-lt"/>
+                <a:ea typeface="+mj-ea"/>
+                <a:cs typeface="+mj-cs"/>
+              </a:defRPr>
+            </a:lvl1pPr>
+          </a:lstStyle>
+          <a:p>
+            <a:r>
+              <a:rPr dirty="0">
+                <a:sym typeface="+mn-ea"/>
+              </a:rPr>
+              <a:t>策略模式(The Strategy Pattern)</a:t>
+            </a:r>
+            <a:endParaRPr dirty="0">
+              <a:sym typeface="+mn-ea"/>
+            </a:endParaRPr>
+          </a:p>
+        </p:txBody>
+      </p:sp>
+      <p:sp>
+        <p:nvSpPr>
+          <p:cNvPr id="3" name="文本框 2"/>
+          <p:cNvSpPr txBox="1"/>
+          <p:nvPr/>
+        </p:nvSpPr>
+        <p:spPr>
+          <a:xfrm>
+            <a:off x="566431" y="2057436"/>
+            <a:ext cx="8334776" cy="1753235"/>
+          </a:xfrm>
+          <a:prstGeom prst="rect">
+            <a:avLst/>
+          </a:prstGeom>
+          <a:noFill/>
+        </p:spPr>
+        <p:txBody>
+          <a:bodyPr wrap="square" rtlCol="0">
+            <a:spAutoFit/>
+          </a:bodyPr>
+          <a:lstStyle/>
+          <a:p>
+            <a:pPr indent="0" eaLnBrk="1" hangingPunct="1">
+              <a:lnSpc>
+                <a:spcPct val="150000"/>
+              </a:lnSpc>
+              <a:buFont typeface="Wingdings" panose="05000000000000000000" pitchFamily="2" charset="2"/>
+              <a:buNone/>
+            </a:pPr>
+            <a:r>
+              <a:rPr lang="zh-CN" altLang="en-US" b="1" dirty="0">
+                <a:solidFill>
+                  <a:srgbClr val="0070C0"/>
+                </a:solidFill>
+              </a:rPr>
+              <a:t>缺点</a:t>
+            </a:r>
+            <a:endParaRPr lang="zh-CN" altLang="en-US" dirty="0"/>
+          </a:p>
+          <a:p>
+            <a:pPr marL="457200" indent="-457200" algn="l">
+              <a:lnSpc>
+                <a:spcPct val="200000"/>
+              </a:lnSpc>
+              <a:buClr>
+                <a:srgbClr val="0070C0"/>
+              </a:buClr>
+              <a:buFont typeface="+mj-lt"/>
+              <a:buAutoNum type="arabicPeriod"/>
+            </a:pPr>
+            <a:r>
+              <a:rPr lang="zh-CN" altLang="en-US" sz="1800" dirty="0"/>
+              <a:t>策略类会增多；</a:t>
+            </a:r>
+            <a:endParaRPr lang="zh-CN" altLang="en-US" sz="1800" dirty="0"/>
+          </a:p>
+          <a:p>
+            <a:pPr marL="457200" indent="-457200" algn="l">
+              <a:lnSpc>
+                <a:spcPct val="200000"/>
+              </a:lnSpc>
+              <a:buClr>
+                <a:srgbClr val="0070C0"/>
+              </a:buClr>
+              <a:buFont typeface="+mj-lt"/>
+              <a:buAutoNum type="arabicPeriod"/>
+            </a:pPr>
+            <a:r>
+              <a:rPr lang="zh-CN" altLang="en-US" sz="1800" dirty="0"/>
+              <a:t>所有策略类都需要对外暴露。</a:t>
+            </a:r>
+            <a:endParaRPr lang="zh-CN" altLang="en-US" sz="1800" dirty="0"/>
+          </a:p>
+        </p:txBody>
+      </p:sp>
+    </p:spTree>
+    <p:custDataLst>
+      <p:tags r:id="rId2"/>
+    </p:custDataLst>
+  </p:cSld>
+  <p:clrMapOvr>
+    <a:masterClrMapping/>
+  </p:clrMapOvr>
+</p:sld>
+</file>
+
+<file path=ppt/slides/slide44.xml><?xml version="1.0" encoding="utf-8"?>
+<p:sld xmlns:a="http://schemas.openxmlformats.org/drawingml/2006/main" xmlns:r="http://schemas.openxmlformats.org/officeDocument/2006/relationships" xmlns:p="http://schemas.openxmlformats.org/presentationml/2006/main">
+  <p:cSld>
+    <p:spTree>
+      <p:nvGrpSpPr>
+        <p:cNvPr id="1" name=""/>
+        <p:cNvGrpSpPr/>
+        <p:nvPr/>
+      </p:nvGrpSpPr>
+      <p:grpSpPr>
+        <a:xfrm>
+          <a:off x="0" y="0"/>
+          <a:ext cx="0" cy="0"/>
+          <a:chOff x="0" y="0"/>
+          <a:chExt cx="0" cy="0"/>
+        </a:xfrm>
+      </p:grpSpPr>
+      <p:sp>
+        <p:nvSpPr>
           <p:cNvPr id="2" name="标题 1"/>
           <p:cNvSpPr>
             <a:spLocks noGrp="1"/>
@@ -13335,7 +14563,7 @@
           <a:p>
             <a:r>
               <a:rPr lang="en-US" altLang="zh-CN" sz="3600" dirty="0"/>
-              <a:t>The Mememto Pattern</a:t>
+              <a:t>The Template Pattern</a:t>
             </a:r>
             <a:endParaRPr lang="en-US" altLang="zh-CN" sz="3600" dirty="0"/>
           </a:p>
@@ -13360,7 +14588,801 @@
           <a:p>
             <a:r>
               <a:rPr lang="zh-CN" altLang="en-US" dirty="0"/>
-              <a:t>备忘录模式</a:t>
+              <a:t>模版模式</a:t>
+            </a:r>
+            <a:endParaRPr lang="zh-CN" altLang="en-US" dirty="0"/>
+          </a:p>
+        </p:txBody>
+      </p:sp>
+    </p:spTree>
+  </p:cSld>
+  <p:clrMapOvr>
+    <a:masterClrMapping/>
+  </p:clrMapOvr>
+</p:sld>
+</file>
+
+<file path=ppt/slides/slide45.xml><?xml version="1.0" encoding="utf-8"?>
+<p:sld xmlns:a="http://schemas.openxmlformats.org/drawingml/2006/main" xmlns:r="http://schemas.openxmlformats.org/officeDocument/2006/relationships" xmlns:p="http://schemas.openxmlformats.org/presentationml/2006/main">
+  <p:cSld>
+    <p:spTree>
+      <p:nvGrpSpPr>
+        <p:cNvPr id="1" name=""/>
+        <p:cNvGrpSpPr/>
+        <p:nvPr/>
+      </p:nvGrpSpPr>
+      <p:grpSpPr>
+        <a:xfrm>
+          <a:off x="0" y="0"/>
+          <a:ext cx="0" cy="0"/>
+          <a:chOff x="0" y="0"/>
+          <a:chExt cx="0" cy="0"/>
+        </a:xfrm>
+      </p:grpSpPr>
+      <p:sp>
+        <p:nvSpPr>
+          <p:cNvPr id="8" name="标题 1"/>
+          <p:cNvSpPr txBox="1"/>
+          <p:nvPr>
+            <p:custDataLst>
+              <p:tags r:id="rId1"/>
+            </p:custDataLst>
+          </p:nvPr>
+        </p:nvSpPr>
+        <p:spPr>
+          <a:xfrm>
+            <a:off x="571608" y="661194"/>
+            <a:ext cx="7886700" cy="994172"/>
+          </a:xfrm>
+          <a:prstGeom prst="rect">
+            <a:avLst/>
+          </a:prstGeom>
+        </p:spPr>
+        <p:txBody>
+          <a:bodyPr vert="horz" wrap="square" lIns="68580" tIns="34290" rIns="68580" bIns="34290" rtlCol="0" anchor="ctr">
+            <a:normAutofit/>
+          </a:bodyPr>
+          <a:lstStyle>
+            <a:lvl1pPr defTabSz="914400">
+              <a:lnSpc>
+                <a:spcPct val="120000"/>
+              </a:lnSpc>
+              <a:spcBef>
+                <a:spcPct val="0"/>
+              </a:spcBef>
+              <a:buNone/>
+              <a:defRPr sz="3600">
+                <a:solidFill>
+                  <a:schemeClr val="tx1">
+                    <a:lumMod val="75000"/>
+                    <a:lumOff val="25000"/>
+                  </a:schemeClr>
+                </a:solidFill>
+                <a:latin typeface="+mj-lt"/>
+                <a:ea typeface="+mj-ea"/>
+                <a:cs typeface="+mj-cs"/>
+              </a:defRPr>
+            </a:lvl1pPr>
+          </a:lstStyle>
+          <a:p>
+            <a:r>
+              <a:rPr dirty="0">
+                <a:sym typeface="+mn-ea"/>
+              </a:rPr>
+              <a:t>模版模式(</a:t>
+            </a:r>
+            <a:r>
+              <a:rPr lang="en-US" altLang="zh-CN" dirty="0">
+                <a:sym typeface="+mn-ea"/>
+              </a:rPr>
+              <a:t>The Template Pattern</a:t>
+            </a:r>
+            <a:r>
+              <a:rPr dirty="0">
+                <a:sym typeface="+mn-ea"/>
+              </a:rPr>
+              <a:t>)</a:t>
+            </a:r>
+            <a:endParaRPr dirty="0">
+              <a:sym typeface="+mn-ea"/>
+            </a:endParaRPr>
+          </a:p>
+        </p:txBody>
+      </p:sp>
+      <p:sp>
+        <p:nvSpPr>
+          <p:cNvPr id="3" name="文本框 2"/>
+          <p:cNvSpPr txBox="1"/>
+          <p:nvPr/>
+        </p:nvSpPr>
+        <p:spPr>
+          <a:xfrm>
+            <a:off x="566431" y="2057436"/>
+            <a:ext cx="8334776" cy="2306955"/>
+          </a:xfrm>
+          <a:prstGeom prst="rect">
+            <a:avLst/>
+          </a:prstGeom>
+          <a:noFill/>
+        </p:spPr>
+        <p:txBody>
+          <a:bodyPr wrap="square" rtlCol="0">
+            <a:spAutoFit/>
+          </a:bodyPr>
+          <a:lstStyle/>
+          <a:p>
+            <a:pPr indent="0" eaLnBrk="1" hangingPunct="1">
+              <a:lnSpc>
+                <a:spcPct val="150000"/>
+              </a:lnSpc>
+              <a:buFont typeface="Wingdings" panose="05000000000000000000" pitchFamily="2" charset="2"/>
+              <a:buNone/>
+            </a:pPr>
+            <a:r>
+              <a:rPr lang="zh-CN" altLang="en-US" b="1" dirty="0">
+                <a:solidFill>
+                  <a:srgbClr val="0070C0"/>
+                </a:solidFill>
+              </a:rPr>
+              <a:t>定义</a:t>
+            </a:r>
+            <a:endParaRPr lang="zh-CN" altLang="en-US" dirty="0"/>
+          </a:p>
+          <a:p>
+            <a:pPr marL="0" indent="461010" eaLnBrk="1" latinLnBrk="0" hangingPunct="1">
+              <a:lnSpc>
+                <a:spcPct val="200000"/>
+              </a:lnSpc>
+              <a:buClr>
+                <a:srgbClr val="0070C0"/>
+              </a:buClr>
+              <a:buFont typeface="+mj-lt"/>
+              <a:buNone/>
+            </a:pPr>
+            <a:r>
+              <a:rPr sz="1800" dirty="0"/>
+              <a:t>一个抽象类公开定义了执行它的方法的方式/模板。它的子类可以按需要重写方法实现，但调用将以抽象类中定义的方式进行。这种类型的设计模式属于行为型模式。</a:t>
+            </a:r>
+            <a:endParaRPr sz="1800" dirty="0"/>
+          </a:p>
+        </p:txBody>
+      </p:sp>
+    </p:spTree>
+    <p:custDataLst>
+      <p:tags r:id="rId2"/>
+    </p:custDataLst>
+  </p:cSld>
+  <p:clrMapOvr>
+    <a:masterClrMapping/>
+  </p:clrMapOvr>
+</p:sld>
+</file>
+
+<file path=ppt/slides/slide46.xml><?xml version="1.0" encoding="utf-8"?>
+<p:sld xmlns:a="http://schemas.openxmlformats.org/drawingml/2006/main" xmlns:r="http://schemas.openxmlformats.org/officeDocument/2006/relationships" xmlns:p="http://schemas.openxmlformats.org/presentationml/2006/main">
+  <p:cSld>
+    <p:spTree>
+      <p:nvGrpSpPr>
+        <p:cNvPr id="1" name=""/>
+        <p:cNvGrpSpPr/>
+        <p:nvPr/>
+      </p:nvGrpSpPr>
+      <p:grpSpPr>
+        <a:xfrm>
+          <a:off x="0" y="0"/>
+          <a:ext cx="0" cy="0"/>
+          <a:chOff x="0" y="0"/>
+          <a:chExt cx="0" cy="0"/>
+        </a:xfrm>
+      </p:grpSpPr>
+      <p:sp>
+        <p:nvSpPr>
+          <p:cNvPr id="8" name="标题 1"/>
+          <p:cNvSpPr txBox="1"/>
+          <p:nvPr>
+            <p:custDataLst>
+              <p:tags r:id="rId1"/>
+            </p:custDataLst>
+          </p:nvPr>
+        </p:nvSpPr>
+        <p:spPr>
+          <a:xfrm>
+            <a:off x="571608" y="661194"/>
+            <a:ext cx="7886700" cy="994172"/>
+          </a:xfrm>
+          <a:prstGeom prst="rect">
+            <a:avLst/>
+          </a:prstGeom>
+        </p:spPr>
+        <p:txBody>
+          <a:bodyPr vert="horz" wrap="square" lIns="68580" tIns="34290" rIns="68580" bIns="34290" rtlCol="0" anchor="ctr">
+            <a:normAutofit/>
+          </a:bodyPr>
+          <a:lstStyle>
+            <a:lvl1pPr defTabSz="914400">
+              <a:lnSpc>
+                <a:spcPct val="120000"/>
+              </a:lnSpc>
+              <a:spcBef>
+                <a:spcPct val="0"/>
+              </a:spcBef>
+              <a:buNone/>
+              <a:defRPr sz="3600">
+                <a:solidFill>
+                  <a:schemeClr val="tx1">
+                    <a:lumMod val="75000"/>
+                    <a:lumOff val="25000"/>
+                  </a:schemeClr>
+                </a:solidFill>
+                <a:latin typeface="+mj-lt"/>
+                <a:ea typeface="+mj-ea"/>
+                <a:cs typeface="+mj-cs"/>
+              </a:defRPr>
+            </a:lvl1pPr>
+          </a:lstStyle>
+          <a:p>
+            <a:r>
+              <a:rPr dirty="0">
+                <a:sym typeface="+mn-ea"/>
+              </a:rPr>
+              <a:t>模版模式(</a:t>
+            </a:r>
+            <a:r>
+              <a:rPr lang="en-US" altLang="zh-CN" dirty="0">
+                <a:sym typeface="+mn-ea"/>
+              </a:rPr>
+              <a:t>The Template Pattern</a:t>
+            </a:r>
+            <a:r>
+              <a:rPr dirty="0">
+                <a:sym typeface="+mn-ea"/>
+              </a:rPr>
+              <a:t>)</a:t>
+            </a:r>
+            <a:endParaRPr dirty="0">
+              <a:sym typeface="+mn-ea"/>
+            </a:endParaRPr>
+          </a:p>
+        </p:txBody>
+      </p:sp>
+      <p:sp>
+        <p:nvSpPr>
+          <p:cNvPr id="3" name="文本框 2"/>
+          <p:cNvSpPr txBox="1"/>
+          <p:nvPr/>
+        </p:nvSpPr>
+        <p:spPr>
+          <a:xfrm>
+            <a:off x="566431" y="2057436"/>
+            <a:ext cx="8334776" cy="2122805"/>
+          </a:xfrm>
+          <a:prstGeom prst="rect">
+            <a:avLst/>
+          </a:prstGeom>
+          <a:noFill/>
+        </p:spPr>
+        <p:txBody>
+          <a:bodyPr wrap="square" rtlCol="0">
+            <a:spAutoFit/>
+          </a:bodyPr>
+          <a:lstStyle/>
+          <a:p>
+            <a:pPr indent="0" eaLnBrk="1" hangingPunct="1">
+              <a:lnSpc>
+                <a:spcPct val="150000"/>
+              </a:lnSpc>
+              <a:buFont typeface="Wingdings" panose="05000000000000000000" pitchFamily="2" charset="2"/>
+              <a:buNone/>
+            </a:pPr>
+            <a:r>
+              <a:rPr lang="zh-CN" altLang="en-US" b="1" dirty="0">
+                <a:solidFill>
+                  <a:srgbClr val="0070C0"/>
+                </a:solidFill>
+              </a:rPr>
+              <a:t>适用场景</a:t>
+            </a:r>
+            <a:endParaRPr lang="en-US" altLang="zh-CN" b="1" dirty="0">
+              <a:solidFill>
+                <a:srgbClr val="0070C0"/>
+              </a:solidFill>
+            </a:endParaRPr>
+          </a:p>
+          <a:p>
+            <a:pPr marL="342900" indent="-342900" eaLnBrk="1" latinLnBrk="0" hangingPunct="1">
+              <a:lnSpc>
+                <a:spcPct val="200000"/>
+              </a:lnSpc>
+              <a:buClr>
+                <a:srgbClr val="0070C0"/>
+              </a:buClr>
+              <a:buFont typeface="+mj-lt"/>
+              <a:buAutoNum type="arabicPeriod"/>
+            </a:pPr>
+            <a:endParaRPr sz="1600" dirty="0"/>
+          </a:p>
+          <a:p>
+            <a:pPr marL="342900" indent="-342900" eaLnBrk="1" latinLnBrk="0" hangingPunct="1">
+              <a:lnSpc>
+                <a:spcPct val="200000"/>
+              </a:lnSpc>
+              <a:buClr>
+                <a:srgbClr val="0070C0"/>
+              </a:buClr>
+              <a:buFont typeface="+mj-lt"/>
+              <a:buAutoNum type="arabicPeriod"/>
+            </a:pPr>
+            <a:r>
+              <a:rPr sz="1600" dirty="0"/>
+              <a:t>有多个子类共有的方法，且逻辑相同</a:t>
+            </a:r>
+            <a:r>
+              <a:rPr lang="zh-CN" sz="1600" dirty="0"/>
+              <a:t>；</a:t>
+            </a:r>
+            <a:endParaRPr lang="zh-CN" sz="1600" dirty="0"/>
+          </a:p>
+          <a:p>
+            <a:pPr marL="342900" indent="-342900" eaLnBrk="1" latinLnBrk="0" hangingPunct="1">
+              <a:lnSpc>
+                <a:spcPct val="200000"/>
+              </a:lnSpc>
+              <a:buClr>
+                <a:srgbClr val="0070C0"/>
+              </a:buClr>
+              <a:buFont typeface="+mj-lt"/>
+              <a:buAutoNum type="arabicPeriod"/>
+            </a:pPr>
+            <a:r>
+              <a:rPr sz="1600" dirty="0"/>
+              <a:t>重要的、复杂的方法，可以考虑作为模板方法</a:t>
+            </a:r>
+            <a:r>
+              <a:rPr lang="zh-CN" sz="1600" dirty="0"/>
+              <a:t>；</a:t>
+            </a:r>
+            <a:endParaRPr lang="zh-CN" sz="1600" dirty="0"/>
+          </a:p>
+        </p:txBody>
+      </p:sp>
+    </p:spTree>
+    <p:custDataLst>
+      <p:tags r:id="rId2"/>
+    </p:custDataLst>
+  </p:cSld>
+  <p:clrMapOvr>
+    <a:masterClrMapping/>
+  </p:clrMapOvr>
+</p:sld>
+</file>
+
+<file path=ppt/slides/slide47.xml><?xml version="1.0" encoding="utf-8"?>
+<p:sld xmlns:a="http://schemas.openxmlformats.org/drawingml/2006/main" xmlns:r="http://schemas.openxmlformats.org/officeDocument/2006/relationships" xmlns:p="http://schemas.openxmlformats.org/presentationml/2006/main">
+  <p:cSld>
+    <p:spTree>
+      <p:nvGrpSpPr>
+        <p:cNvPr id="1" name=""/>
+        <p:cNvGrpSpPr/>
+        <p:nvPr/>
+      </p:nvGrpSpPr>
+      <p:grpSpPr>
+        <a:xfrm>
+          <a:off x="0" y="0"/>
+          <a:ext cx="0" cy="0"/>
+          <a:chOff x="0" y="0"/>
+          <a:chExt cx="0" cy="0"/>
+        </a:xfrm>
+      </p:grpSpPr>
+      <p:sp>
+        <p:nvSpPr>
+          <p:cNvPr id="8" name="标题 1"/>
+          <p:cNvSpPr txBox="1"/>
+          <p:nvPr>
+            <p:custDataLst>
+              <p:tags r:id="rId1"/>
+            </p:custDataLst>
+          </p:nvPr>
+        </p:nvSpPr>
+        <p:spPr>
+          <a:xfrm>
+            <a:off x="571608" y="661194"/>
+            <a:ext cx="7886700" cy="994172"/>
+          </a:xfrm>
+          <a:prstGeom prst="rect">
+            <a:avLst/>
+          </a:prstGeom>
+        </p:spPr>
+        <p:txBody>
+          <a:bodyPr vert="horz" wrap="square" lIns="68580" tIns="34290" rIns="68580" bIns="34290" rtlCol="0" anchor="ctr">
+            <a:normAutofit/>
+          </a:bodyPr>
+          <a:lstStyle>
+            <a:lvl1pPr defTabSz="914400">
+              <a:lnSpc>
+                <a:spcPct val="120000"/>
+              </a:lnSpc>
+              <a:spcBef>
+                <a:spcPct val="0"/>
+              </a:spcBef>
+              <a:buNone/>
+              <a:defRPr sz="3600">
+                <a:solidFill>
+                  <a:schemeClr val="tx1">
+                    <a:lumMod val="75000"/>
+                    <a:lumOff val="25000"/>
+                  </a:schemeClr>
+                </a:solidFill>
+                <a:latin typeface="+mj-lt"/>
+                <a:ea typeface="+mj-ea"/>
+                <a:cs typeface="+mj-cs"/>
+              </a:defRPr>
+            </a:lvl1pPr>
+          </a:lstStyle>
+          <a:p>
+            <a:r>
+              <a:rPr dirty="0">
+                <a:sym typeface="+mn-ea"/>
+              </a:rPr>
+              <a:t>模版模式(</a:t>
+            </a:r>
+            <a:r>
+              <a:rPr lang="en-US" altLang="zh-CN" dirty="0">
+                <a:sym typeface="+mn-ea"/>
+              </a:rPr>
+              <a:t>The Template Pattern</a:t>
+            </a:r>
+            <a:r>
+              <a:rPr dirty="0">
+                <a:sym typeface="+mn-ea"/>
+              </a:rPr>
+              <a:t>)</a:t>
+            </a:r>
+            <a:endParaRPr dirty="0">
+              <a:sym typeface="+mn-ea"/>
+            </a:endParaRPr>
+          </a:p>
+        </p:txBody>
+      </p:sp>
+      <p:sp>
+        <p:nvSpPr>
+          <p:cNvPr id="3" name="文本框 2"/>
+          <p:cNvSpPr txBox="1"/>
+          <p:nvPr/>
+        </p:nvSpPr>
+        <p:spPr>
+          <a:xfrm>
+            <a:off x="566431" y="2057436"/>
+            <a:ext cx="8334776" cy="2861310"/>
+          </a:xfrm>
+          <a:prstGeom prst="rect">
+            <a:avLst/>
+          </a:prstGeom>
+          <a:noFill/>
+        </p:spPr>
+        <p:txBody>
+          <a:bodyPr wrap="square" rtlCol="0">
+            <a:spAutoFit/>
+          </a:bodyPr>
+          <a:lstStyle/>
+          <a:p>
+            <a:pPr indent="0" eaLnBrk="1" hangingPunct="1">
+              <a:lnSpc>
+                <a:spcPct val="150000"/>
+              </a:lnSpc>
+              <a:buFont typeface="Wingdings" panose="05000000000000000000" pitchFamily="2" charset="2"/>
+              <a:buNone/>
+            </a:pPr>
+            <a:r>
+              <a:rPr lang="zh-CN" altLang="en-US" b="1" dirty="0">
+                <a:solidFill>
+                  <a:srgbClr val="0070C0"/>
+                </a:solidFill>
+              </a:rPr>
+              <a:t>优点</a:t>
+            </a:r>
+            <a:endParaRPr lang="zh-CN" altLang="en-US" b="1" dirty="0">
+              <a:solidFill>
+                <a:srgbClr val="0070C0"/>
+              </a:solidFill>
+            </a:endParaRPr>
+          </a:p>
+          <a:p>
+            <a:pPr indent="0" eaLnBrk="1" hangingPunct="1">
+              <a:lnSpc>
+                <a:spcPct val="150000"/>
+              </a:lnSpc>
+              <a:buFont typeface="Wingdings" panose="05000000000000000000" pitchFamily="2" charset="2"/>
+              <a:buNone/>
+            </a:pPr>
+            <a:endParaRPr lang="zh-CN" altLang="en-US" dirty="0"/>
+          </a:p>
+          <a:p>
+            <a:pPr marL="457200" indent="-457200" eaLnBrk="1" latinLnBrk="0" hangingPunct="1">
+              <a:lnSpc>
+                <a:spcPct val="200000"/>
+              </a:lnSpc>
+              <a:buClr>
+                <a:srgbClr val="0070C0"/>
+              </a:buClr>
+              <a:buFont typeface="+mj-lt"/>
+              <a:buAutoNum type="arabicPeriod"/>
+            </a:pPr>
+            <a:r>
+              <a:rPr lang="zh-CN" altLang="en-US" sz="1800" dirty="0"/>
+              <a:t>封装不变部分，扩展可变部分；</a:t>
+            </a:r>
+            <a:endParaRPr lang="zh-CN" altLang="en-US" sz="1800" dirty="0"/>
+          </a:p>
+          <a:p>
+            <a:pPr marL="457200" indent="-457200" eaLnBrk="1" latinLnBrk="0" hangingPunct="1">
+              <a:lnSpc>
+                <a:spcPct val="200000"/>
+              </a:lnSpc>
+              <a:buClr>
+                <a:srgbClr val="0070C0"/>
+              </a:buClr>
+              <a:buFont typeface="+mj-lt"/>
+              <a:buAutoNum type="arabicPeriod"/>
+            </a:pPr>
+            <a:r>
+              <a:rPr lang="zh-CN" altLang="en-US" sz="1800" dirty="0"/>
+              <a:t>提取公共代码，便于维护；</a:t>
+            </a:r>
+            <a:endParaRPr lang="zh-CN" altLang="en-US" sz="1800" dirty="0"/>
+          </a:p>
+          <a:p>
+            <a:pPr marL="457200" indent="-457200" eaLnBrk="1" latinLnBrk="0" hangingPunct="1">
+              <a:lnSpc>
+                <a:spcPct val="200000"/>
+              </a:lnSpc>
+              <a:buClr>
+                <a:srgbClr val="0070C0"/>
+              </a:buClr>
+              <a:buFont typeface="+mj-lt"/>
+              <a:buAutoNum type="arabicPeriod"/>
+            </a:pPr>
+            <a:r>
+              <a:rPr lang="zh-CN" altLang="en-US" sz="1800" dirty="0"/>
+              <a:t>行为由父类控制，子类实现；</a:t>
+            </a:r>
+            <a:endParaRPr lang="zh-CN" altLang="en-US" sz="1800" dirty="0"/>
+          </a:p>
+        </p:txBody>
+      </p:sp>
+    </p:spTree>
+    <p:custDataLst>
+      <p:tags r:id="rId2"/>
+    </p:custDataLst>
+  </p:cSld>
+  <p:clrMapOvr>
+    <a:masterClrMapping/>
+  </p:clrMapOvr>
+</p:sld>
+</file>
+
+<file path=ppt/slides/slide48.xml><?xml version="1.0" encoding="utf-8"?>
+<p:sld xmlns:a="http://schemas.openxmlformats.org/drawingml/2006/main" xmlns:r="http://schemas.openxmlformats.org/officeDocument/2006/relationships" xmlns:p="http://schemas.openxmlformats.org/presentationml/2006/main">
+  <p:cSld>
+    <p:spTree>
+      <p:nvGrpSpPr>
+        <p:cNvPr id="1" name=""/>
+        <p:cNvGrpSpPr/>
+        <p:nvPr/>
+      </p:nvGrpSpPr>
+      <p:grpSpPr>
+        <a:xfrm>
+          <a:off x="0" y="0"/>
+          <a:ext cx="0" cy="0"/>
+          <a:chOff x="0" y="0"/>
+          <a:chExt cx="0" cy="0"/>
+        </a:xfrm>
+      </p:grpSpPr>
+      <p:sp>
+        <p:nvSpPr>
+          <p:cNvPr id="8" name="标题 1"/>
+          <p:cNvSpPr txBox="1"/>
+          <p:nvPr>
+            <p:custDataLst>
+              <p:tags r:id="rId1"/>
+            </p:custDataLst>
+          </p:nvPr>
+        </p:nvSpPr>
+        <p:spPr>
+          <a:xfrm>
+            <a:off x="571608" y="661194"/>
+            <a:ext cx="7886700" cy="994172"/>
+          </a:xfrm>
+          <a:prstGeom prst="rect">
+            <a:avLst/>
+          </a:prstGeom>
+        </p:spPr>
+        <p:txBody>
+          <a:bodyPr vert="horz" wrap="square" lIns="68580" tIns="34290" rIns="68580" bIns="34290" rtlCol="0" anchor="ctr">
+            <a:normAutofit/>
+          </a:bodyPr>
+          <a:lstStyle>
+            <a:lvl1pPr defTabSz="914400">
+              <a:lnSpc>
+                <a:spcPct val="120000"/>
+              </a:lnSpc>
+              <a:spcBef>
+                <a:spcPct val="0"/>
+              </a:spcBef>
+              <a:buNone/>
+              <a:defRPr sz="3600">
+                <a:solidFill>
+                  <a:schemeClr val="tx1">
+                    <a:lumMod val="75000"/>
+                    <a:lumOff val="25000"/>
+                  </a:schemeClr>
+                </a:solidFill>
+                <a:latin typeface="+mj-lt"/>
+                <a:ea typeface="+mj-ea"/>
+                <a:cs typeface="+mj-cs"/>
+              </a:defRPr>
+            </a:lvl1pPr>
+          </a:lstStyle>
+          <a:p>
+            <a:r>
+              <a:rPr dirty="0">
+                <a:sym typeface="+mn-ea"/>
+              </a:rPr>
+              <a:t>模版模式(</a:t>
+            </a:r>
+            <a:r>
+              <a:rPr lang="en-US" altLang="zh-CN" dirty="0">
+                <a:sym typeface="+mn-ea"/>
+              </a:rPr>
+              <a:t>The Template Pattern</a:t>
+            </a:r>
+            <a:r>
+              <a:rPr dirty="0">
+                <a:sym typeface="+mn-ea"/>
+              </a:rPr>
+              <a:t>)</a:t>
+            </a:r>
+            <a:endParaRPr dirty="0">
+              <a:sym typeface="+mn-ea"/>
+            </a:endParaRPr>
+          </a:p>
+        </p:txBody>
+      </p:sp>
+      <p:sp>
+        <p:nvSpPr>
+          <p:cNvPr id="3" name="文本框 2"/>
+          <p:cNvSpPr txBox="1"/>
+          <p:nvPr/>
+        </p:nvSpPr>
+        <p:spPr>
+          <a:xfrm>
+            <a:off x="566431" y="2057436"/>
+            <a:ext cx="8334776" cy="1753235"/>
+          </a:xfrm>
+          <a:prstGeom prst="rect">
+            <a:avLst/>
+          </a:prstGeom>
+          <a:noFill/>
+        </p:spPr>
+        <p:txBody>
+          <a:bodyPr wrap="square" rtlCol="0">
+            <a:spAutoFit/>
+          </a:bodyPr>
+          <a:lstStyle/>
+          <a:p>
+            <a:pPr indent="0" eaLnBrk="1" hangingPunct="1">
+              <a:lnSpc>
+                <a:spcPct val="150000"/>
+              </a:lnSpc>
+              <a:buFont typeface="Wingdings" panose="05000000000000000000" pitchFamily="2" charset="2"/>
+              <a:buNone/>
+            </a:pPr>
+            <a:r>
+              <a:rPr lang="zh-CN" altLang="en-US" b="1" dirty="0">
+                <a:solidFill>
+                  <a:srgbClr val="0070C0"/>
+                </a:solidFill>
+              </a:rPr>
+              <a:t>缺点</a:t>
+            </a:r>
+            <a:endParaRPr lang="zh-CN" altLang="en-US" dirty="0"/>
+          </a:p>
+          <a:p>
+            <a:pPr marL="457200" indent="-457200" algn="l">
+              <a:lnSpc>
+                <a:spcPct val="200000"/>
+              </a:lnSpc>
+              <a:buClr>
+                <a:srgbClr val="0070C0"/>
+              </a:buClr>
+              <a:buFont typeface="+mj-lt"/>
+              <a:buAutoNum type="arabicPeriod"/>
+            </a:pPr>
+            <a:r>
+              <a:rPr lang="zh-CN" altLang="en-US" sz="1800" dirty="0"/>
+              <a:t>每一个不同的实现都需要一个子类来实现，导致类的个数增加，使得系统更加庞大。</a:t>
+            </a:r>
+            <a:endParaRPr lang="zh-CN" altLang="en-US" sz="1800" dirty="0"/>
+          </a:p>
+        </p:txBody>
+      </p:sp>
+    </p:spTree>
+    <p:custDataLst>
+      <p:tags r:id="rId2"/>
+    </p:custDataLst>
+  </p:cSld>
+  <p:clrMapOvr>
+    <a:masterClrMapping/>
+  </p:clrMapOvr>
+</p:sld>
+</file>
+
+<file path=ppt/slides/slide49.xml><?xml version="1.0" encoding="utf-8"?>
+<p:sld xmlns:a="http://schemas.openxmlformats.org/drawingml/2006/main" xmlns:r="http://schemas.openxmlformats.org/officeDocument/2006/relationships" xmlns:p="http://schemas.openxmlformats.org/presentationml/2006/main">
+  <p:cSld>
+    <p:spTree>
+      <p:nvGrpSpPr>
+        <p:cNvPr id="1" name=""/>
+        <p:cNvGrpSpPr/>
+        <p:nvPr/>
+      </p:nvGrpSpPr>
+      <p:grpSpPr>
+        <a:xfrm>
+          <a:off x="0" y="0"/>
+          <a:ext cx="0" cy="0"/>
+          <a:chOff x="0" y="0"/>
+          <a:chExt cx="0" cy="0"/>
+        </a:xfrm>
+      </p:grpSpPr>
+      <p:sp>
+        <p:nvSpPr>
+          <p:cNvPr id="2" name="标题 1"/>
+          <p:cNvSpPr>
+            <a:spLocks noGrp="1"/>
+          </p:cNvSpPr>
+          <p:nvPr>
+            <p:ph type="title"/>
+          </p:nvPr>
+        </p:nvSpPr>
+        <p:spPr>
+          <a:xfrm>
+            <a:off x="1138792" y="3078833"/>
+            <a:ext cx="6856892" cy="830998"/>
+          </a:xfrm>
+        </p:spPr>
+        <p:txBody>
+          <a:bodyPr>
+            <a:noAutofit/>
+          </a:bodyPr>
+          <a:lstStyle/>
+          <a:p>
+            <a:r>
+              <a:rPr lang="en-US" altLang="zh-CN" sz="3600" dirty="0"/>
+              <a:t>The Visitor Pattern</a:t>
+            </a:r>
+            <a:endParaRPr lang="en-US" altLang="zh-CN" sz="3600" dirty="0"/>
+          </a:p>
+        </p:txBody>
+      </p:sp>
+      <p:sp>
+        <p:nvSpPr>
+          <p:cNvPr id="3" name="内容占位符 2"/>
+          <p:cNvSpPr>
+            <a:spLocks noGrp="1"/>
+          </p:cNvSpPr>
+          <p:nvPr>
+            <p:ph sz="quarter" idx="13"/>
+          </p:nvPr>
+        </p:nvSpPr>
+        <p:spPr/>
+        <p:txBody>
+          <a:bodyPr>
+            <a:normAutofit/>
+          </a:bodyPr>
+          <a:lstStyle/>
+          <a:p>
+            <a:r>
+              <a:rPr lang="zh-CN" altLang="en-US" dirty="0"/>
+              <a:t>访问者模式</a:t>
             </a:r>
             <a:endParaRPr lang="zh-CN" altLang="en-US" dirty="0"/>
           </a:p>
@@ -13541,6 +15563,86 @@
     <p:custDataLst>
       <p:tags r:id="rId2"/>
     </p:custDataLst>
+  </p:cSld>
+  <p:clrMapOvr>
+    <a:masterClrMapping/>
+  </p:clrMapOvr>
+</p:sld>
+</file>
+
+<file path=ppt/slides/slide50.xml><?xml version="1.0" encoding="utf-8"?>
+<p:sld xmlns:a="http://schemas.openxmlformats.org/drawingml/2006/main" xmlns:r="http://schemas.openxmlformats.org/officeDocument/2006/relationships" xmlns:p="http://schemas.openxmlformats.org/presentationml/2006/main">
+  <p:cSld>
+    <p:spTree>
+      <p:nvGrpSpPr>
+        <p:cNvPr id="1" name=""/>
+        <p:cNvGrpSpPr/>
+        <p:nvPr/>
+      </p:nvGrpSpPr>
+      <p:grpSpPr>
+        <a:xfrm>
+          <a:off x="0" y="0"/>
+          <a:ext cx="0" cy="0"/>
+          <a:chOff x="0" y="0"/>
+          <a:chExt cx="0" cy="0"/>
+        </a:xfrm>
+      </p:grpSpPr>
+      <p:sp>
+        <p:nvSpPr>
+          <p:cNvPr id="2" name="标题 1"/>
+          <p:cNvSpPr>
+            <a:spLocks noGrp="1"/>
+          </p:cNvSpPr>
+          <p:nvPr>
+            <p:ph type="title"/>
+          </p:nvPr>
+        </p:nvSpPr>
+        <p:spPr>
+          <a:xfrm>
+            <a:off x="1138792" y="3078833"/>
+            <a:ext cx="6856892" cy="830998"/>
+          </a:xfrm>
+        </p:spPr>
+        <p:txBody>
+          <a:bodyPr>
+            <a:noAutofit/>
+          </a:bodyPr>
+          <a:lstStyle/>
+          <a:p>
+            <a:r>
+              <a:rPr lang="en-US" altLang="zh-CN" sz="3600" dirty="0"/>
+              <a:t>The Mememto Pattern</a:t>
+            </a:r>
+            <a:endParaRPr lang="en-US" altLang="zh-CN" sz="3600" dirty="0"/>
+          </a:p>
+        </p:txBody>
+      </p:sp>
+      <p:sp>
+        <p:nvSpPr>
+          <p:cNvPr id="3" name="内容占位符 2"/>
+          <p:cNvSpPr>
+            <a:spLocks noGrp="1"/>
+          </p:cNvSpPr>
+          <p:nvPr>
+            <p:ph sz="quarter" idx="13"/>
+          </p:nvPr>
+        </p:nvSpPr>
+        <p:spPr/>
+        <p:txBody>
+          <a:bodyPr>
+            <a:normAutofit/>
+          </a:bodyPr>
+          <a:lstStyle/>
+          <a:p>
+            <a:r>
+              <a:rPr lang="zh-CN" altLang="en-US" dirty="0"/>
+              <a:t>备忘录模式</a:t>
+            </a:r>
+            <a:endParaRPr lang="zh-CN" altLang="en-US" dirty="0"/>
+          </a:p>
+        </p:txBody>
+      </p:sp>
+    </p:spTree>
   </p:cSld>
   <p:clrMapOvr>
     <a:masterClrMapping/>
@@ -15643,6 +17745,182 @@
 </p:tagLst>
 </file>
 
+<file path=ppt/tags/tag81.xml><?xml version="1.0" encoding="utf-8"?>
+<p:tagLst xmlns:p="http://schemas.openxmlformats.org/presentationml/2006/main">
+  <p:tag name="KSO_WM_TEMPLATE_CATEGORY" val="custom"/>
+  <p:tag name="KSO_WM_TEMPLATE_INDEX" val="20186830"/>
+  <p:tag name="KSO_WM_TAG_VERSION" val="1.0"/>
+  <p:tag name="KSO_WM_BEAUTIFY_FLAG" val="#wm#"/>
+  <p:tag name="KSO_WM_UNIT_TYPE" val="a"/>
+  <p:tag name="KSO_WM_UNIT_INDEX" val="1"/>
+  <p:tag name="KSO_WM_UNIT_ID" val="custom20186830_7*a*1"/>
+  <p:tag name="KSO_WM_UNIT_LAYERLEVEL" val="1"/>
+  <p:tag name="KSO_WM_UNIT_VALUE" val="19"/>
+  <p:tag name="KSO_WM_UNIT_ISCONTENTSTITLE" val="0"/>
+  <p:tag name="KSO_WM_UNIT_HIGHLIGHT" val="0"/>
+  <p:tag name="KSO_WM_UNIT_COMPATIBLE" val="0"/>
+  <p:tag name="KSO_WM_UNIT_CLEAR" val="0"/>
+  <p:tag name="KSO_WM_UNIT_PRESET_TEXT_INDEX" val="3"/>
+  <p:tag name="KSO_WM_UNIT_PRESET_TEXT_LEN" val="17"/>
+</p:tagLst>
+</file>
+
+<file path=ppt/tags/tag82.xml><?xml version="1.0" encoding="utf-8"?>
+<p:tagLst xmlns:p="http://schemas.openxmlformats.org/presentationml/2006/main">
+  <p:tag name="KSO_WM_TEMPLATE_CATEGORY" val="custom"/>
+  <p:tag name="KSO_WM_TEMPLATE_INDEX" val="20186830"/>
+  <p:tag name="KSO_WM_TAG_VERSION" val="1.0"/>
+  <p:tag name="KSO_WM_SLIDE_ID" val="custom20186830_7"/>
+  <p:tag name="KSO_WM_SLIDE_INDEX" val="7"/>
+  <p:tag name="KSO_WM_SLIDE_ITEM_CNT" val="1"/>
+  <p:tag name="KSO_WM_SLIDE_LAYOUT" val="a_l"/>
+  <p:tag name="KSO_WM_SLIDE_LAYOUT_CNT" val="1_1"/>
+  <p:tag name="KSO_WM_SLIDE_TYPE" val="text"/>
+  <p:tag name="KSO_WM_BEAUTIFY_FLAG" val="#wm#"/>
+  <p:tag name="KSO_WM_SLIDE_POSITION" val="25*85"/>
+  <p:tag name="KSO_WM_SLIDE_SIZE" val="452*279"/>
+  <p:tag name="KSO_WM_DIAGRAM_GROUP_CODE" val="l1-1"/>
+  <p:tag name="KSO_WM_SLIDE_SUBTYPE" val="diag"/>
+</p:tagLst>
+</file>
+
+<file path=ppt/tags/tag83.xml><?xml version="1.0" encoding="utf-8"?>
+<p:tagLst xmlns:p="http://schemas.openxmlformats.org/presentationml/2006/main">
+  <p:tag name="KSO_WM_TEMPLATE_CATEGORY" val="custom"/>
+  <p:tag name="KSO_WM_TEMPLATE_INDEX" val="20186830"/>
+  <p:tag name="KSO_WM_TAG_VERSION" val="1.0"/>
+  <p:tag name="KSO_WM_BEAUTIFY_FLAG" val="#wm#"/>
+  <p:tag name="KSO_WM_UNIT_TYPE" val="a"/>
+  <p:tag name="KSO_WM_UNIT_INDEX" val="1"/>
+  <p:tag name="KSO_WM_UNIT_ID" val="custom20186830_7*a*1"/>
+  <p:tag name="KSO_WM_UNIT_LAYERLEVEL" val="1"/>
+  <p:tag name="KSO_WM_UNIT_VALUE" val="19"/>
+  <p:tag name="KSO_WM_UNIT_ISCONTENTSTITLE" val="0"/>
+  <p:tag name="KSO_WM_UNIT_HIGHLIGHT" val="0"/>
+  <p:tag name="KSO_WM_UNIT_COMPATIBLE" val="0"/>
+  <p:tag name="KSO_WM_UNIT_CLEAR" val="0"/>
+  <p:tag name="KSO_WM_UNIT_PRESET_TEXT_INDEX" val="3"/>
+  <p:tag name="KSO_WM_UNIT_PRESET_TEXT_LEN" val="17"/>
+</p:tagLst>
+</file>
+
+<file path=ppt/tags/tag84.xml><?xml version="1.0" encoding="utf-8"?>
+<p:tagLst xmlns:p="http://schemas.openxmlformats.org/presentationml/2006/main">
+  <p:tag name="KSO_WM_TEMPLATE_CATEGORY" val="custom"/>
+  <p:tag name="KSO_WM_TEMPLATE_INDEX" val="20186830"/>
+  <p:tag name="KSO_WM_TAG_VERSION" val="1.0"/>
+  <p:tag name="KSO_WM_SLIDE_ID" val="custom20186830_7"/>
+  <p:tag name="KSO_WM_SLIDE_INDEX" val="7"/>
+  <p:tag name="KSO_WM_SLIDE_ITEM_CNT" val="1"/>
+  <p:tag name="KSO_WM_SLIDE_LAYOUT" val="a_l"/>
+  <p:tag name="KSO_WM_SLIDE_LAYOUT_CNT" val="1_1"/>
+  <p:tag name="KSO_WM_SLIDE_TYPE" val="text"/>
+  <p:tag name="KSO_WM_BEAUTIFY_FLAG" val="#wm#"/>
+  <p:tag name="KSO_WM_SLIDE_POSITION" val="25*85"/>
+  <p:tag name="KSO_WM_SLIDE_SIZE" val="452*279"/>
+  <p:tag name="KSO_WM_DIAGRAM_GROUP_CODE" val="l1-1"/>
+  <p:tag name="KSO_WM_SLIDE_SUBTYPE" val="diag"/>
+</p:tagLst>
+</file>
+
+<file path=ppt/tags/tag85.xml><?xml version="1.0" encoding="utf-8"?>
+<p:tagLst xmlns:p="http://schemas.openxmlformats.org/presentationml/2006/main">
+  <p:tag name="KSO_WM_TEMPLATE_CATEGORY" val="custom"/>
+  <p:tag name="KSO_WM_TEMPLATE_INDEX" val="20186830"/>
+  <p:tag name="KSO_WM_TAG_VERSION" val="1.0"/>
+  <p:tag name="KSO_WM_BEAUTIFY_FLAG" val="#wm#"/>
+  <p:tag name="KSO_WM_UNIT_TYPE" val="a"/>
+  <p:tag name="KSO_WM_UNIT_INDEX" val="1"/>
+  <p:tag name="KSO_WM_UNIT_ID" val="custom20186830_7*a*1"/>
+  <p:tag name="KSO_WM_UNIT_LAYERLEVEL" val="1"/>
+  <p:tag name="KSO_WM_UNIT_VALUE" val="19"/>
+  <p:tag name="KSO_WM_UNIT_ISCONTENTSTITLE" val="0"/>
+  <p:tag name="KSO_WM_UNIT_HIGHLIGHT" val="0"/>
+  <p:tag name="KSO_WM_UNIT_COMPATIBLE" val="0"/>
+  <p:tag name="KSO_WM_UNIT_CLEAR" val="0"/>
+  <p:tag name="KSO_WM_UNIT_PRESET_TEXT_INDEX" val="3"/>
+  <p:tag name="KSO_WM_UNIT_PRESET_TEXT_LEN" val="17"/>
+</p:tagLst>
+</file>
+
+<file path=ppt/tags/tag86.xml><?xml version="1.0" encoding="utf-8"?>
+<p:tagLst xmlns:p="http://schemas.openxmlformats.org/presentationml/2006/main">
+  <p:tag name="KSO_WM_TEMPLATE_CATEGORY" val="custom"/>
+  <p:tag name="KSO_WM_TEMPLATE_INDEX" val="20186830"/>
+  <p:tag name="KSO_WM_TAG_VERSION" val="1.0"/>
+  <p:tag name="KSO_WM_SLIDE_ID" val="custom20186830_7"/>
+  <p:tag name="KSO_WM_SLIDE_INDEX" val="7"/>
+  <p:tag name="KSO_WM_SLIDE_ITEM_CNT" val="1"/>
+  <p:tag name="KSO_WM_SLIDE_LAYOUT" val="a_l"/>
+  <p:tag name="KSO_WM_SLIDE_LAYOUT_CNT" val="1_1"/>
+  <p:tag name="KSO_WM_SLIDE_TYPE" val="text"/>
+  <p:tag name="KSO_WM_BEAUTIFY_FLAG" val="#wm#"/>
+  <p:tag name="KSO_WM_SLIDE_POSITION" val="25*85"/>
+  <p:tag name="KSO_WM_SLIDE_SIZE" val="452*279"/>
+  <p:tag name="KSO_WM_DIAGRAM_GROUP_CODE" val="l1-1"/>
+  <p:tag name="KSO_WM_SLIDE_SUBTYPE" val="diag"/>
+</p:tagLst>
+</file>
+
+<file path=ppt/tags/tag87.xml><?xml version="1.0" encoding="utf-8"?>
+<p:tagLst xmlns:p="http://schemas.openxmlformats.org/presentationml/2006/main">
+  <p:tag name="KSO_WM_TEMPLATE_CATEGORY" val="custom"/>
+  <p:tag name="KSO_WM_TEMPLATE_INDEX" val="20186830"/>
+  <p:tag name="KSO_WM_TAG_VERSION" val="1.0"/>
+  <p:tag name="KSO_WM_BEAUTIFY_FLAG" val="#wm#"/>
+  <p:tag name="KSO_WM_UNIT_TYPE" val="a"/>
+  <p:tag name="KSO_WM_UNIT_INDEX" val="1"/>
+  <p:tag name="KSO_WM_UNIT_ID" val="custom20186830_7*a*1"/>
+  <p:tag name="KSO_WM_UNIT_LAYERLEVEL" val="1"/>
+  <p:tag name="KSO_WM_UNIT_VALUE" val="19"/>
+  <p:tag name="KSO_WM_UNIT_ISCONTENTSTITLE" val="0"/>
+  <p:tag name="KSO_WM_UNIT_HIGHLIGHT" val="0"/>
+  <p:tag name="KSO_WM_UNIT_COMPATIBLE" val="0"/>
+  <p:tag name="KSO_WM_UNIT_CLEAR" val="0"/>
+  <p:tag name="KSO_WM_UNIT_PRESET_TEXT_INDEX" val="3"/>
+  <p:tag name="KSO_WM_UNIT_PRESET_TEXT_LEN" val="17"/>
+</p:tagLst>
+</file>
+
+<file path=ppt/tags/tag88.xml><?xml version="1.0" encoding="utf-8"?>
+<p:tagLst xmlns:p="http://schemas.openxmlformats.org/presentationml/2006/main">
+  <p:tag name="KSO_WM_TEMPLATE_CATEGORY" val="custom"/>
+  <p:tag name="KSO_WM_TEMPLATE_INDEX" val="20186830"/>
+  <p:tag name="KSO_WM_TAG_VERSION" val="1.0"/>
+  <p:tag name="KSO_WM_SLIDE_ID" val="custom20186830_7"/>
+  <p:tag name="KSO_WM_SLIDE_INDEX" val="7"/>
+  <p:tag name="KSO_WM_SLIDE_ITEM_CNT" val="1"/>
+  <p:tag name="KSO_WM_SLIDE_LAYOUT" val="a_l"/>
+  <p:tag name="KSO_WM_SLIDE_LAYOUT_CNT" val="1_1"/>
+  <p:tag name="KSO_WM_SLIDE_TYPE" val="text"/>
+  <p:tag name="KSO_WM_BEAUTIFY_FLAG" val="#wm#"/>
+  <p:tag name="KSO_WM_SLIDE_POSITION" val="25*85"/>
+  <p:tag name="KSO_WM_SLIDE_SIZE" val="452*279"/>
+  <p:tag name="KSO_WM_DIAGRAM_GROUP_CODE" val="l1-1"/>
+  <p:tag name="KSO_WM_SLIDE_SUBTYPE" val="diag"/>
+</p:tagLst>
+</file>
+
+<file path=ppt/tags/tag89.xml><?xml version="1.0" encoding="utf-8"?>
+<p:tagLst xmlns:p="http://schemas.openxmlformats.org/presentationml/2006/main">
+  <p:tag name="KSO_WM_TEMPLATE_CATEGORY" val="custom"/>
+  <p:tag name="KSO_WM_TEMPLATE_INDEX" val="20186830"/>
+  <p:tag name="KSO_WM_TAG_VERSION" val="1.0"/>
+  <p:tag name="KSO_WM_BEAUTIFY_FLAG" val="#wm#"/>
+  <p:tag name="KSO_WM_UNIT_TYPE" val="a"/>
+  <p:tag name="KSO_WM_UNIT_INDEX" val="1"/>
+  <p:tag name="KSO_WM_UNIT_ID" val="custom20186830_7*a*1"/>
+  <p:tag name="KSO_WM_UNIT_LAYERLEVEL" val="1"/>
+  <p:tag name="KSO_WM_UNIT_VALUE" val="19"/>
+  <p:tag name="KSO_WM_UNIT_ISCONTENTSTITLE" val="0"/>
+  <p:tag name="KSO_WM_UNIT_HIGHLIGHT" val="0"/>
+  <p:tag name="KSO_WM_UNIT_COMPATIBLE" val="0"/>
+  <p:tag name="KSO_WM_UNIT_CLEAR" val="0"/>
+  <p:tag name="KSO_WM_UNIT_PRESET_TEXT_INDEX" val="3"/>
+  <p:tag name="KSO_WM_UNIT_PRESET_TEXT_LEN" val="17"/>
+</p:tagLst>
+</file>
+
 <file path=ppt/tags/tag9.xml><?xml version="1.0" encoding="utf-8"?>
 <p:tagLst xmlns:p="http://schemas.openxmlformats.org/presentationml/2006/main">
   <p:tag name="KSO_WM_TAG_VERSION" val="1.0"/>
@@ -15652,6 +17930,142 @@
   <p:tag name="KSO_WM_TEMPLATE_CATEGORY" val="custom"/>
   <p:tag name="KSO_WM_TEMPLATE_INDEX" val="20184556"/>
   <p:tag name="KSO_WM_UNIT_INDEX" val="5"/>
+</p:tagLst>
+</file>
+
+<file path=ppt/tags/tag90.xml><?xml version="1.0" encoding="utf-8"?>
+<p:tagLst xmlns:p="http://schemas.openxmlformats.org/presentationml/2006/main">
+  <p:tag name="KSO_WM_TEMPLATE_CATEGORY" val="custom"/>
+  <p:tag name="KSO_WM_TEMPLATE_INDEX" val="20186830"/>
+  <p:tag name="KSO_WM_TAG_VERSION" val="1.0"/>
+  <p:tag name="KSO_WM_SLIDE_ID" val="custom20186830_7"/>
+  <p:tag name="KSO_WM_SLIDE_INDEX" val="7"/>
+  <p:tag name="KSO_WM_SLIDE_ITEM_CNT" val="1"/>
+  <p:tag name="KSO_WM_SLIDE_LAYOUT" val="a_l"/>
+  <p:tag name="KSO_WM_SLIDE_LAYOUT_CNT" val="1_1"/>
+  <p:tag name="KSO_WM_SLIDE_TYPE" val="text"/>
+  <p:tag name="KSO_WM_BEAUTIFY_FLAG" val="#wm#"/>
+  <p:tag name="KSO_WM_SLIDE_POSITION" val="25*85"/>
+  <p:tag name="KSO_WM_SLIDE_SIZE" val="452*279"/>
+  <p:tag name="KSO_WM_DIAGRAM_GROUP_CODE" val="l1-1"/>
+  <p:tag name="KSO_WM_SLIDE_SUBTYPE" val="diag"/>
+</p:tagLst>
+</file>
+
+<file path=ppt/tags/tag91.xml><?xml version="1.0" encoding="utf-8"?>
+<p:tagLst xmlns:p="http://schemas.openxmlformats.org/presentationml/2006/main">
+  <p:tag name="KSO_WM_TEMPLATE_CATEGORY" val="custom"/>
+  <p:tag name="KSO_WM_TEMPLATE_INDEX" val="20186830"/>
+  <p:tag name="KSO_WM_TAG_VERSION" val="1.0"/>
+  <p:tag name="KSO_WM_BEAUTIFY_FLAG" val="#wm#"/>
+  <p:tag name="KSO_WM_UNIT_TYPE" val="a"/>
+  <p:tag name="KSO_WM_UNIT_INDEX" val="1"/>
+  <p:tag name="KSO_WM_UNIT_ID" val="custom20186830_7*a*1"/>
+  <p:tag name="KSO_WM_UNIT_LAYERLEVEL" val="1"/>
+  <p:tag name="KSO_WM_UNIT_VALUE" val="19"/>
+  <p:tag name="KSO_WM_UNIT_ISCONTENTSTITLE" val="0"/>
+  <p:tag name="KSO_WM_UNIT_HIGHLIGHT" val="0"/>
+  <p:tag name="KSO_WM_UNIT_COMPATIBLE" val="0"/>
+  <p:tag name="KSO_WM_UNIT_CLEAR" val="0"/>
+  <p:tag name="KSO_WM_UNIT_PRESET_TEXT_INDEX" val="3"/>
+  <p:tag name="KSO_WM_UNIT_PRESET_TEXT_LEN" val="17"/>
+</p:tagLst>
+</file>
+
+<file path=ppt/tags/tag92.xml><?xml version="1.0" encoding="utf-8"?>
+<p:tagLst xmlns:p="http://schemas.openxmlformats.org/presentationml/2006/main">
+  <p:tag name="KSO_WM_TEMPLATE_CATEGORY" val="custom"/>
+  <p:tag name="KSO_WM_TEMPLATE_INDEX" val="20186830"/>
+  <p:tag name="KSO_WM_TAG_VERSION" val="1.0"/>
+  <p:tag name="KSO_WM_SLIDE_ID" val="custom20186830_7"/>
+  <p:tag name="KSO_WM_SLIDE_INDEX" val="7"/>
+  <p:tag name="KSO_WM_SLIDE_ITEM_CNT" val="1"/>
+  <p:tag name="KSO_WM_SLIDE_LAYOUT" val="a_l"/>
+  <p:tag name="KSO_WM_SLIDE_LAYOUT_CNT" val="1_1"/>
+  <p:tag name="KSO_WM_SLIDE_TYPE" val="text"/>
+  <p:tag name="KSO_WM_BEAUTIFY_FLAG" val="#wm#"/>
+  <p:tag name="KSO_WM_SLIDE_POSITION" val="25*85"/>
+  <p:tag name="KSO_WM_SLIDE_SIZE" val="452*279"/>
+  <p:tag name="KSO_WM_DIAGRAM_GROUP_CODE" val="l1-1"/>
+  <p:tag name="KSO_WM_SLIDE_SUBTYPE" val="diag"/>
+</p:tagLst>
+</file>
+
+<file path=ppt/tags/tag93.xml><?xml version="1.0" encoding="utf-8"?>
+<p:tagLst xmlns:p="http://schemas.openxmlformats.org/presentationml/2006/main">
+  <p:tag name="KSO_WM_TEMPLATE_CATEGORY" val="custom"/>
+  <p:tag name="KSO_WM_TEMPLATE_INDEX" val="20186830"/>
+  <p:tag name="KSO_WM_TAG_VERSION" val="1.0"/>
+  <p:tag name="KSO_WM_BEAUTIFY_FLAG" val="#wm#"/>
+  <p:tag name="KSO_WM_UNIT_TYPE" val="a"/>
+  <p:tag name="KSO_WM_UNIT_INDEX" val="1"/>
+  <p:tag name="KSO_WM_UNIT_ID" val="custom20186830_7*a*1"/>
+  <p:tag name="KSO_WM_UNIT_LAYERLEVEL" val="1"/>
+  <p:tag name="KSO_WM_UNIT_VALUE" val="19"/>
+  <p:tag name="KSO_WM_UNIT_ISCONTENTSTITLE" val="0"/>
+  <p:tag name="KSO_WM_UNIT_HIGHLIGHT" val="0"/>
+  <p:tag name="KSO_WM_UNIT_COMPATIBLE" val="0"/>
+  <p:tag name="KSO_WM_UNIT_CLEAR" val="0"/>
+  <p:tag name="KSO_WM_UNIT_PRESET_TEXT_INDEX" val="3"/>
+  <p:tag name="KSO_WM_UNIT_PRESET_TEXT_LEN" val="17"/>
+</p:tagLst>
+</file>
+
+<file path=ppt/tags/tag94.xml><?xml version="1.0" encoding="utf-8"?>
+<p:tagLst xmlns:p="http://schemas.openxmlformats.org/presentationml/2006/main">
+  <p:tag name="KSO_WM_TEMPLATE_CATEGORY" val="custom"/>
+  <p:tag name="KSO_WM_TEMPLATE_INDEX" val="20186830"/>
+  <p:tag name="KSO_WM_TAG_VERSION" val="1.0"/>
+  <p:tag name="KSO_WM_SLIDE_ID" val="custom20186830_7"/>
+  <p:tag name="KSO_WM_SLIDE_INDEX" val="7"/>
+  <p:tag name="KSO_WM_SLIDE_ITEM_CNT" val="1"/>
+  <p:tag name="KSO_WM_SLIDE_LAYOUT" val="a_l"/>
+  <p:tag name="KSO_WM_SLIDE_LAYOUT_CNT" val="1_1"/>
+  <p:tag name="KSO_WM_SLIDE_TYPE" val="text"/>
+  <p:tag name="KSO_WM_BEAUTIFY_FLAG" val="#wm#"/>
+  <p:tag name="KSO_WM_SLIDE_POSITION" val="25*85"/>
+  <p:tag name="KSO_WM_SLIDE_SIZE" val="452*279"/>
+  <p:tag name="KSO_WM_DIAGRAM_GROUP_CODE" val="l1-1"/>
+  <p:tag name="KSO_WM_SLIDE_SUBTYPE" val="diag"/>
+</p:tagLst>
+</file>
+
+<file path=ppt/tags/tag95.xml><?xml version="1.0" encoding="utf-8"?>
+<p:tagLst xmlns:p="http://schemas.openxmlformats.org/presentationml/2006/main">
+  <p:tag name="KSO_WM_TEMPLATE_CATEGORY" val="custom"/>
+  <p:tag name="KSO_WM_TEMPLATE_INDEX" val="20186830"/>
+  <p:tag name="KSO_WM_TAG_VERSION" val="1.0"/>
+  <p:tag name="KSO_WM_BEAUTIFY_FLAG" val="#wm#"/>
+  <p:tag name="KSO_WM_UNIT_TYPE" val="a"/>
+  <p:tag name="KSO_WM_UNIT_INDEX" val="1"/>
+  <p:tag name="KSO_WM_UNIT_ID" val="custom20186830_7*a*1"/>
+  <p:tag name="KSO_WM_UNIT_LAYERLEVEL" val="1"/>
+  <p:tag name="KSO_WM_UNIT_VALUE" val="19"/>
+  <p:tag name="KSO_WM_UNIT_ISCONTENTSTITLE" val="0"/>
+  <p:tag name="KSO_WM_UNIT_HIGHLIGHT" val="0"/>
+  <p:tag name="KSO_WM_UNIT_COMPATIBLE" val="0"/>
+  <p:tag name="KSO_WM_UNIT_CLEAR" val="0"/>
+  <p:tag name="KSO_WM_UNIT_PRESET_TEXT_INDEX" val="3"/>
+  <p:tag name="KSO_WM_UNIT_PRESET_TEXT_LEN" val="17"/>
+</p:tagLst>
+</file>
+
+<file path=ppt/tags/tag96.xml><?xml version="1.0" encoding="utf-8"?>
+<p:tagLst xmlns:p="http://schemas.openxmlformats.org/presentationml/2006/main">
+  <p:tag name="KSO_WM_TEMPLATE_CATEGORY" val="custom"/>
+  <p:tag name="KSO_WM_TEMPLATE_INDEX" val="20186830"/>
+  <p:tag name="KSO_WM_TAG_VERSION" val="1.0"/>
+  <p:tag name="KSO_WM_SLIDE_ID" val="custom20186830_7"/>
+  <p:tag name="KSO_WM_SLIDE_INDEX" val="7"/>
+  <p:tag name="KSO_WM_SLIDE_ITEM_CNT" val="1"/>
+  <p:tag name="KSO_WM_SLIDE_LAYOUT" val="a_l"/>
+  <p:tag name="KSO_WM_SLIDE_LAYOUT_CNT" val="1_1"/>
+  <p:tag name="KSO_WM_SLIDE_TYPE" val="text"/>
+  <p:tag name="KSO_WM_BEAUTIFY_FLAG" val="#wm#"/>
+  <p:tag name="KSO_WM_SLIDE_POSITION" val="25*85"/>
+  <p:tag name="KSO_WM_SLIDE_SIZE" val="452*279"/>
+  <p:tag name="KSO_WM_DIAGRAM_GROUP_CODE" val="l1-1"/>
+  <p:tag name="KSO_WM_SLIDE_SUBTYPE" val="diag"/>
 </p:tagLst>
 </file>
 

</xml_diff>